<commit_message>
improved some of the slides, especially around windows, and watermarks
</commit_message>
<xml_diff>
--- a/slides/flink_stream_statefulOps.pptx
+++ b/slides/flink_stream_statefulOps.pptx
@@ -6,7 +6,7 @@
     <p:sldMasterId id="2147483671" r:id="rId2"/>
   </p:sldMasterIdLst>
   <p:notesMasterIdLst>
-    <p:notesMasterId r:id="rId28"/>
+    <p:notesMasterId r:id="rId30"/>
   </p:notesMasterIdLst>
   <p:sldIdLst>
     <p:sldId id="256" r:id="rId3"/>
@@ -18,22 +18,24 @@
     <p:sldId id="262" r:id="rId9"/>
     <p:sldId id="263" r:id="rId10"/>
     <p:sldId id="264" r:id="rId11"/>
-    <p:sldId id="265" r:id="rId12"/>
-    <p:sldId id="266" r:id="rId13"/>
-    <p:sldId id="267" r:id="rId14"/>
-    <p:sldId id="268" r:id="rId15"/>
-    <p:sldId id="279" r:id="rId16"/>
-    <p:sldId id="278" r:id="rId17"/>
-    <p:sldId id="281" r:id="rId18"/>
-    <p:sldId id="280" r:id="rId19"/>
-    <p:sldId id="270" r:id="rId20"/>
-    <p:sldId id="271" r:id="rId21"/>
-    <p:sldId id="272" r:id="rId22"/>
-    <p:sldId id="273" r:id="rId23"/>
-    <p:sldId id="274" r:id="rId24"/>
-    <p:sldId id="275" r:id="rId25"/>
-    <p:sldId id="276" r:id="rId26"/>
-    <p:sldId id="277" r:id="rId27"/>
+    <p:sldId id="282" r:id="rId12"/>
+    <p:sldId id="283" r:id="rId13"/>
+    <p:sldId id="265" r:id="rId14"/>
+    <p:sldId id="266" r:id="rId15"/>
+    <p:sldId id="267" r:id="rId16"/>
+    <p:sldId id="268" r:id="rId17"/>
+    <p:sldId id="279" r:id="rId18"/>
+    <p:sldId id="278" r:id="rId19"/>
+    <p:sldId id="281" r:id="rId20"/>
+    <p:sldId id="280" r:id="rId21"/>
+    <p:sldId id="270" r:id="rId22"/>
+    <p:sldId id="271" r:id="rId23"/>
+    <p:sldId id="272" r:id="rId24"/>
+    <p:sldId id="273" r:id="rId25"/>
+    <p:sldId id="274" r:id="rId26"/>
+    <p:sldId id="275" r:id="rId27"/>
+    <p:sldId id="276" r:id="rId28"/>
+    <p:sldId id="277" r:id="rId29"/>
   </p:sldIdLst>
   <p:sldSz cx="9144000" cy="6858000" type="screen4x3"/>
   <p:notesSz cx="6858000" cy="9144000"/>
@@ -1295,7 +1297,7 @@
                 <a:cs typeface="Calibri"/>
                 <a:sym typeface="Calibri"/>
               </a:rPr>
-              <a:t>19</a:t>
+              <a:t>21</a:t>
             </a:fld>
             <a:endParaRPr lang="en" sz="1200">
               <a:solidFill>
@@ -15884,7 +15886,7 @@
                 <a:cs typeface="Calibri"/>
                 <a:sym typeface="Calibri"/>
               </a:rPr>
-              <a:t>27</a:t>
+              <a:t>13</a:t>
             </a:r>
             <a:r>
               <a:rPr lang="en" sz="2000" dirty="0" smtClean="0">
@@ -15899,7 +15901,7 @@
               <a:t>.</a:t>
             </a:r>
             <a:r>
-              <a:rPr lang="en-US" sz="2000" dirty="0" smtClean="0">
+              <a:rPr lang="en-US" sz="2000" smtClean="0">
                 <a:solidFill>
                   <a:schemeClr val="lt1"/>
                 </a:solidFill>
@@ -15908,10 +15910,10 @@
                 <a:cs typeface="Calibri"/>
                 <a:sym typeface="Calibri"/>
               </a:rPr>
-              <a:t>02</a:t>
+              <a:t>03</a:t>
             </a:r>
             <a:r>
-              <a:rPr lang="en" sz="2000" b="0" i="0" u="none" strike="noStrike" cap="none" dirty="0" smtClean="0">
+              <a:rPr lang="en" sz="2000" b="0" i="0" u="none" strike="noStrike" cap="none" smtClean="0">
                 <a:solidFill>
                   <a:schemeClr val="lt1"/>
                 </a:solidFill>
@@ -15995,6 +15997,318 @@
 </file>
 
 <file path=ppt/slides/slide10.xml><?xml version="1.0" encoding="utf-8"?>
+<p:sld xmlns:a="http://schemas.openxmlformats.org/drawingml/2006/main" xmlns:r="http://schemas.openxmlformats.org/officeDocument/2006/relationships" xmlns:p="http://schemas.openxmlformats.org/presentationml/2006/main">
+  <p:cSld>
+    <p:spTree>
+      <p:nvGrpSpPr>
+        <p:cNvPr id="1" name=""/>
+        <p:cNvGrpSpPr/>
+        <p:nvPr/>
+      </p:nvGrpSpPr>
+      <p:grpSpPr>
+        <a:xfrm>
+          <a:off x="0" y="0"/>
+          <a:ext cx="0" cy="0"/>
+          <a:chOff x="0" y="0"/>
+          <a:chExt cx="0" cy="0"/>
+        </a:xfrm>
+      </p:grpSpPr>
+      <p:sp>
+        <p:nvSpPr>
+          <p:cNvPr id="3" name="Titel 2"/>
+          <p:cNvSpPr>
+            <a:spLocks noGrp="1"/>
+          </p:cNvSpPr>
+          <p:nvPr>
+            <p:ph type="title"/>
+          </p:nvPr>
+        </p:nvSpPr>
+        <p:spPr/>
+        <p:txBody>
+          <a:bodyPr>
+            <a:normAutofit/>
+          </a:bodyPr>
+          <a:lstStyle/>
+          <a:p>
+            <a:r>
+              <a:rPr lang="en-US" dirty="0" smtClean="0"/>
+              <a:t>Checkpoint Procedure</a:t>
+            </a:r>
+            <a:endParaRPr lang="en-US" dirty="0"/>
+          </a:p>
+        </p:txBody>
+      </p:sp>
+      <p:sp>
+        <p:nvSpPr>
+          <p:cNvPr id="2" name="Slide Number Placeholder 1"/>
+          <p:cNvSpPr>
+            <a:spLocks noGrp="1"/>
+          </p:cNvSpPr>
+          <p:nvPr>
+            <p:ph type="sldNum" sz="quarter" idx="12"/>
+          </p:nvPr>
+        </p:nvSpPr>
+        <p:spPr/>
+        <p:txBody>
+          <a:bodyPr/>
+          <a:lstStyle/>
+          <a:p>
+            <a:fld id="{B07C5D84-2227-C144-B485-A8CA33CE4230}" type="slidenum">
+              <a:rPr lang="en-US" smtClean="0">
+                <a:solidFill>
+                  <a:prstClr val="black">
+                    <a:tint val="75000"/>
+                  </a:prstClr>
+                </a:solidFill>
+              </a:rPr>
+              <a:pPr/>
+              <a:t>10</a:t>
+            </a:fld>
+            <a:endParaRPr lang="en-US">
+              <a:solidFill>
+                <a:prstClr val="black">
+                  <a:tint val="75000"/>
+                </a:prstClr>
+              </a:solidFill>
+            </a:endParaRPr>
+          </a:p>
+        </p:txBody>
+      </p:sp>
+      <p:pic>
+        <p:nvPicPr>
+          <p:cNvPr id="5" name="Picture 4" descr="text4288.png"/>
+          <p:cNvPicPr>
+            <a:picLocks noChangeAspect="1"/>
+          </p:cNvPicPr>
+          <p:nvPr/>
+        </p:nvPicPr>
+        <p:blipFill rotWithShape="1">
+          <a:blip r:embed="rId2" cstate="screen">
+            <a:extLst>
+              <a:ext uri="{28A0092B-C50C-407E-A947-70E740481C1C}">
+                <a14:useLocalDpi xmlns:a14="http://schemas.microsoft.com/office/drawing/2010/main"/>
+              </a:ext>
+            </a:extLst>
+          </a:blip>
+          <a:srcRect/>
+          <a:stretch/>
+        </p:blipFill>
+        <p:spPr>
+          <a:xfrm>
+            <a:off x="644978" y="1509328"/>
+            <a:ext cx="3734992" cy="4393072"/>
+          </a:xfrm>
+          <a:prstGeom prst="rect">
+            <a:avLst/>
+          </a:prstGeom>
+        </p:spPr>
+      </p:pic>
+      <p:pic>
+        <p:nvPicPr>
+          <p:cNvPr id="6" name="Picture 3" descr="check2.png"/>
+          <p:cNvPicPr>
+            <a:picLocks noChangeAspect="1"/>
+          </p:cNvPicPr>
+          <p:nvPr/>
+        </p:nvPicPr>
+        <p:blipFill rotWithShape="1">
+          <a:blip r:embed="rId3" cstate="screen">
+            <a:extLst>
+              <a:ext uri="{28A0092B-C50C-407E-A947-70E740481C1C}">
+                <a14:useLocalDpi xmlns:a14="http://schemas.microsoft.com/office/drawing/2010/main"/>
+              </a:ext>
+            </a:extLst>
+          </a:blip>
+          <a:srcRect/>
+          <a:stretch/>
+        </p:blipFill>
+        <p:spPr>
+          <a:xfrm>
+            <a:off x="4843713" y="1514521"/>
+            <a:ext cx="3045009" cy="4388789"/>
+          </a:xfrm>
+          <a:prstGeom prst="rect">
+            <a:avLst/>
+          </a:prstGeom>
+        </p:spPr>
+      </p:pic>
+    </p:spTree>
+    <p:extLst>
+      <p:ext uri="{BB962C8B-B14F-4D97-AF65-F5344CB8AC3E}">
+        <p14:creationId xmlns:p14="http://schemas.microsoft.com/office/powerpoint/2010/main" val="3275952378"/>
+      </p:ext>
+    </p:extLst>
+  </p:cSld>
+  <p:clrMapOvr>
+    <a:masterClrMapping/>
+  </p:clrMapOvr>
+  <p:timing>
+    <p:tnLst>
+      <p:par>
+        <p:cTn xmlns:p14="http://schemas.microsoft.com/office/powerpoint/2010/main" id="1" dur="indefinite" restart="never" nodeType="tmRoot"/>
+      </p:par>
+    </p:tnLst>
+  </p:timing>
+</p:sld>
+</file>
+
+<file path=ppt/slides/slide11.xml><?xml version="1.0" encoding="utf-8"?>
+<p:sld xmlns:a="http://schemas.openxmlformats.org/drawingml/2006/main" xmlns:r="http://schemas.openxmlformats.org/officeDocument/2006/relationships" xmlns:p="http://schemas.openxmlformats.org/presentationml/2006/main">
+  <p:cSld>
+    <p:spTree>
+      <p:nvGrpSpPr>
+        <p:cNvPr id="1" name=""/>
+        <p:cNvGrpSpPr/>
+        <p:nvPr/>
+      </p:nvGrpSpPr>
+      <p:grpSpPr>
+        <a:xfrm>
+          <a:off x="0" y="0"/>
+          <a:ext cx="0" cy="0"/>
+          <a:chOff x="0" y="0"/>
+          <a:chExt cx="0" cy="0"/>
+        </a:xfrm>
+      </p:grpSpPr>
+      <p:sp>
+        <p:nvSpPr>
+          <p:cNvPr id="3" name="Titel 2"/>
+          <p:cNvSpPr>
+            <a:spLocks noGrp="1"/>
+          </p:cNvSpPr>
+          <p:nvPr>
+            <p:ph type="title"/>
+          </p:nvPr>
+        </p:nvSpPr>
+        <p:spPr/>
+        <p:txBody>
+          <a:bodyPr>
+            <a:normAutofit/>
+          </a:bodyPr>
+          <a:lstStyle/>
+          <a:p>
+            <a:r>
+              <a:rPr lang="en-US" dirty="0" smtClean="0"/>
+              <a:t>Checkpoint Procedure</a:t>
+            </a:r>
+            <a:endParaRPr lang="en-US" dirty="0"/>
+          </a:p>
+        </p:txBody>
+      </p:sp>
+      <p:sp>
+        <p:nvSpPr>
+          <p:cNvPr id="2" name="Slide Number Placeholder 1"/>
+          <p:cNvSpPr>
+            <a:spLocks noGrp="1"/>
+          </p:cNvSpPr>
+          <p:nvPr>
+            <p:ph type="sldNum" sz="quarter" idx="12"/>
+          </p:nvPr>
+        </p:nvSpPr>
+        <p:spPr/>
+        <p:txBody>
+          <a:bodyPr/>
+          <a:lstStyle/>
+          <a:p>
+            <a:fld id="{B07C5D84-2227-C144-B485-A8CA33CE4230}" type="slidenum">
+              <a:rPr lang="en-US" smtClean="0">
+                <a:solidFill>
+                  <a:prstClr val="black">
+                    <a:tint val="75000"/>
+                  </a:prstClr>
+                </a:solidFill>
+              </a:rPr>
+              <a:pPr/>
+              <a:t>11</a:t>
+            </a:fld>
+            <a:endParaRPr lang="en-US">
+              <a:solidFill>
+                <a:prstClr val="black">
+                  <a:tint val="75000"/>
+                </a:prstClr>
+              </a:solidFill>
+            </a:endParaRPr>
+          </a:p>
+        </p:txBody>
+      </p:sp>
+      <p:pic>
+        <p:nvPicPr>
+          <p:cNvPr id="7" name="Picture 3" descr="check3.png"/>
+          <p:cNvPicPr>
+            <a:picLocks noChangeAspect="1"/>
+          </p:cNvPicPr>
+          <p:nvPr/>
+        </p:nvPicPr>
+        <p:blipFill rotWithShape="1">
+          <a:blip r:embed="rId2" cstate="screen">
+            <a:extLst>
+              <a:ext uri="{28A0092B-C50C-407E-A947-70E740481C1C}">
+                <a14:useLocalDpi xmlns:a14="http://schemas.microsoft.com/office/drawing/2010/main"/>
+              </a:ext>
+            </a:extLst>
+          </a:blip>
+          <a:srcRect/>
+          <a:stretch/>
+        </p:blipFill>
+        <p:spPr>
+          <a:xfrm>
+            <a:off x="1811553" y="1509327"/>
+            <a:ext cx="2695949" cy="4259515"/>
+          </a:xfrm>
+          <a:prstGeom prst="rect">
+            <a:avLst/>
+          </a:prstGeom>
+        </p:spPr>
+      </p:pic>
+      <p:pic>
+        <p:nvPicPr>
+          <p:cNvPr id="8" name="Picture 3" descr="check4.png"/>
+          <p:cNvPicPr>
+            <a:picLocks noChangeAspect="1"/>
+          </p:cNvPicPr>
+          <p:nvPr/>
+        </p:nvPicPr>
+        <p:blipFill rotWithShape="1">
+          <a:blip r:embed="rId3" cstate="screen">
+            <a:extLst>
+              <a:ext uri="{28A0092B-C50C-407E-A947-70E740481C1C}">
+                <a14:useLocalDpi xmlns:a14="http://schemas.microsoft.com/office/drawing/2010/main"/>
+              </a:ext>
+            </a:extLst>
+          </a:blip>
+          <a:srcRect/>
+          <a:stretch/>
+        </p:blipFill>
+        <p:spPr>
+          <a:xfrm>
+            <a:off x="5279484" y="1514523"/>
+            <a:ext cx="3407316" cy="4325384"/>
+          </a:xfrm>
+          <a:prstGeom prst="rect">
+            <a:avLst/>
+          </a:prstGeom>
+        </p:spPr>
+      </p:pic>
+    </p:spTree>
+    <p:extLst>
+      <p:ext uri="{BB962C8B-B14F-4D97-AF65-F5344CB8AC3E}">
+        <p14:creationId xmlns:p14="http://schemas.microsoft.com/office/powerpoint/2010/main" val="3386515960"/>
+      </p:ext>
+    </p:extLst>
+  </p:cSld>
+  <p:clrMapOvr>
+    <a:masterClrMapping/>
+  </p:clrMapOvr>
+  <p:timing>
+    <p:tnLst>
+      <p:par>
+        <p:cTn xmlns:p14="http://schemas.microsoft.com/office/powerpoint/2010/main" id="1" dur="indefinite" restart="never" nodeType="tmRoot"/>
+      </p:par>
+    </p:tnLst>
+  </p:timing>
+</p:sld>
+</file>
+
+<file path=ppt/slides/slide12.xml><?xml version="1.0" encoding="utf-8"?>
 <p:sld xmlns:a="http://schemas.openxmlformats.org/drawingml/2006/main" xmlns:r="http://schemas.openxmlformats.org/officeDocument/2006/relationships" xmlns:p="http://schemas.openxmlformats.org/presentationml/2006/main">
   <p:cSld>
     <p:spTree>
@@ -16486,7 +16800,7 @@
                 <a:cs typeface="Calibri"/>
                 <a:sym typeface="Calibri"/>
               </a:rPr>
-              <a:t>10</a:t>
+              <a:t>12</a:t>
             </a:fld>
             <a:endParaRPr lang="en" sz="1200">
               <a:solidFill>
@@ -16508,7 +16822,7 @@
 </p:sld>
 </file>
 
-<file path=ppt/slides/slide11.xml><?xml version="1.0" encoding="utf-8"?>
+<file path=ppt/slides/slide13.xml><?xml version="1.0" encoding="utf-8"?>
 <p:sld xmlns:a="http://schemas.openxmlformats.org/drawingml/2006/main" xmlns:r="http://schemas.openxmlformats.org/officeDocument/2006/relationships" xmlns:p="http://schemas.openxmlformats.org/presentationml/2006/main">
   <p:cSld>
     <p:spTree>
@@ -17153,7 +17467,7 @@
                 <a:cs typeface="Calibri"/>
                 <a:sym typeface="Calibri"/>
               </a:rPr>
-              <a:t>11</a:t>
+              <a:t>13</a:t>
             </a:fld>
             <a:endParaRPr lang="en" sz="1200">
               <a:solidFill>
@@ -17175,7 +17489,7 @@
 </p:sld>
 </file>
 
-<file path=ppt/slides/slide12.xml><?xml version="1.0" encoding="utf-8"?>
+<file path=ppt/slides/slide14.xml><?xml version="1.0" encoding="utf-8"?>
 <p:sld xmlns:a="http://schemas.openxmlformats.org/drawingml/2006/main" xmlns:r="http://schemas.openxmlformats.org/officeDocument/2006/relationships" xmlns:p="http://schemas.openxmlformats.org/presentationml/2006/main">
   <p:cSld>
     <p:spTree>
@@ -17381,7 +17695,7 @@
                 <a:cs typeface="Calibri"/>
                 <a:sym typeface="Calibri"/>
               </a:rPr>
-              <a:t>12</a:t>
+              <a:t>14</a:t>
             </a:fld>
             <a:endParaRPr lang="en" sz="1200">
               <a:solidFill>
@@ -17403,7 +17717,7 @@
 </p:sld>
 </file>
 
-<file path=ppt/slides/slide13.xml><?xml version="1.0" encoding="utf-8"?>
+<file path=ppt/slides/slide15.xml><?xml version="1.0" encoding="utf-8"?>
 <p:sld xmlns:a="http://schemas.openxmlformats.org/drawingml/2006/main" xmlns:r="http://schemas.openxmlformats.org/officeDocument/2006/relationships" xmlns:p="http://schemas.openxmlformats.org/presentationml/2006/main">
   <p:cSld>
     <p:spTree>
@@ -17924,7 +18238,7 @@
                 <a:cs typeface="Calibri"/>
                 <a:sym typeface="Calibri"/>
               </a:rPr>
-              <a:t>13</a:t>
+              <a:t>15</a:t>
             </a:fld>
             <a:endParaRPr lang="en" sz="1200">
               <a:solidFill>
@@ -17946,7 +18260,7 @@
 </p:sld>
 </file>
 
-<file path=ppt/slides/slide14.xml><?xml version="1.0" encoding="utf-8"?>
+<file path=ppt/slides/slide16.xml><?xml version="1.0" encoding="utf-8"?>
 <p:sld xmlns:a="http://schemas.openxmlformats.org/drawingml/2006/main" xmlns:r="http://schemas.openxmlformats.org/officeDocument/2006/relationships" xmlns:p="http://schemas.openxmlformats.org/presentationml/2006/main">
   <p:cSld>
     <p:spTree>
@@ -19346,7 +19660,7 @@
 </p:sld>
 </file>
 
-<file path=ppt/slides/slide15.xml><?xml version="1.0" encoding="utf-8"?>
+<file path=ppt/slides/slide17.xml><?xml version="1.0" encoding="utf-8"?>
 <p:sld xmlns:a="http://schemas.openxmlformats.org/drawingml/2006/main" xmlns:r="http://schemas.openxmlformats.org/officeDocument/2006/relationships" xmlns:p="http://schemas.openxmlformats.org/presentationml/2006/main">
   <p:cSld>
     <p:spTree>
@@ -20261,7 +20575,7 @@
 </p:sld>
 </file>
 
-<file path=ppt/slides/slide16.xml><?xml version="1.0" encoding="utf-8"?>
+<file path=ppt/slides/slide18.xml><?xml version="1.0" encoding="utf-8"?>
 <p:sld xmlns:a="http://schemas.openxmlformats.org/drawingml/2006/main" xmlns:r="http://schemas.openxmlformats.org/officeDocument/2006/relationships" xmlns:p="http://schemas.openxmlformats.org/presentationml/2006/main">
   <p:cSld>
     <p:spTree>
@@ -22232,7 +22546,7 @@
 </p:sld>
 </file>
 
-<file path=ppt/slides/slide17.xml><?xml version="1.0" encoding="utf-8"?>
+<file path=ppt/slides/slide19.xml><?xml version="1.0" encoding="utf-8"?>
 <p:sld xmlns:a="http://schemas.openxmlformats.org/drawingml/2006/main" xmlns:r="http://schemas.openxmlformats.org/officeDocument/2006/relationships" xmlns:p="http://schemas.openxmlformats.org/presentationml/2006/main">
   <p:cSld>
     <p:spTree>
@@ -22365,1375 +22679,6 @@
         <p14:creationId xmlns:p14="http://schemas.microsoft.com/office/powerpoint/2010/main" val="394543280"/>
       </p:ext>
     </p:extLst>
-  </p:cSld>
-  <p:clrMapOvr>
-    <a:masterClrMapping/>
-  </p:clrMapOvr>
-</p:sld>
-</file>
-
-<file path=ppt/slides/slide18.xml><?xml version="1.0" encoding="utf-8"?>
-<p:sld xmlns:a="http://schemas.openxmlformats.org/drawingml/2006/main" xmlns:r="http://schemas.openxmlformats.org/officeDocument/2006/relationships" xmlns:p="http://schemas.openxmlformats.org/presentationml/2006/main">
-  <p:cSld>
-    <p:spTree>
-      <p:nvGrpSpPr>
-        <p:cNvPr id="1" name="Shape 233"/>
-        <p:cNvGrpSpPr/>
-        <p:nvPr/>
-      </p:nvGrpSpPr>
-      <p:grpSpPr>
-        <a:xfrm>
-          <a:off x="0" y="0"/>
-          <a:ext cx="0" cy="0"/>
-          <a:chOff x="0" y="0"/>
-          <a:chExt cx="0" cy="0"/>
-        </a:xfrm>
-      </p:grpSpPr>
-      <p:sp>
-        <p:nvSpPr>
-          <p:cNvPr id="234" name="Shape 234"/>
-          <p:cNvSpPr txBox="1">
-            <a:spLocks noGrp="1"/>
-          </p:cNvSpPr>
-          <p:nvPr>
-            <p:ph type="title"/>
-          </p:nvPr>
-        </p:nvSpPr>
-        <p:spPr>
-          <a:xfrm>
-            <a:off x="457200" y="274637"/>
-            <a:ext cx="7474684" cy="898405"/>
-          </a:xfrm>
-          <a:prstGeom prst="rect">
-            <a:avLst/>
-          </a:prstGeom>
-          <a:noFill/>
-          <a:ln>
-            <a:noFill/>
-          </a:ln>
-        </p:spPr>
-        <p:txBody>
-          <a:bodyPr lIns="91425" tIns="45700" rIns="91425" bIns="45700" anchor="ctr" anchorCtr="0">
-            <a:noAutofit/>
-          </a:bodyPr>
-          <a:lstStyle/>
-          <a:p>
-            <a:pPr marL="0" marR="0" lvl="0" indent="0" algn="l" rtl="0">
-              <a:spcBef>
-                <a:spcPts val="0"/>
-              </a:spcBef>
-              <a:buClr>
-                <a:schemeClr val="dk1"/>
-              </a:buClr>
-              <a:buSzPct val="25000"/>
-              <a:buFont typeface="Calibri"/>
-              <a:buNone/>
-            </a:pPr>
-            <a:r>
-              <a:rPr lang="en" sz="4400" b="0" i="0" u="none" strike="noStrike" cap="none" dirty="0">
-                <a:solidFill>
-                  <a:schemeClr val="dk1"/>
-                </a:solidFill>
-                <a:latin typeface="Calibri"/>
-                <a:ea typeface="Calibri"/>
-                <a:cs typeface="Calibri"/>
-                <a:sym typeface="Calibri"/>
-              </a:rPr>
-              <a:t>Using Key-Partitioned State</a:t>
-            </a:r>
-          </a:p>
-        </p:txBody>
-      </p:sp>
-      <p:sp>
-        <p:nvSpPr>
-          <p:cNvPr id="235" name="Shape 235"/>
-          <p:cNvSpPr txBox="1">
-            <a:spLocks noGrp="1"/>
-          </p:cNvSpPr>
-          <p:nvPr>
-            <p:ph type="sldNum" idx="12"/>
-          </p:nvPr>
-        </p:nvSpPr>
-        <p:spPr>
-          <a:xfrm>
-            <a:off x="6553200" y="6356350"/>
-            <a:ext cx="2133599" cy="365125"/>
-          </a:xfrm>
-          <a:prstGeom prst="rect">
-            <a:avLst/>
-          </a:prstGeom>
-          <a:noFill/>
-          <a:ln>
-            <a:noFill/>
-          </a:ln>
-        </p:spPr>
-        <p:txBody>
-          <a:bodyPr lIns="91425" tIns="45700" rIns="91425" bIns="45700" anchor="ctr" anchorCtr="0">
-            <a:noAutofit/>
-          </a:bodyPr>
-          <a:lstStyle/>
-          <a:p>
-            <a:pPr marL="0" marR="0" lvl="0" indent="0" algn="r" rtl="0">
-              <a:spcBef>
-                <a:spcPts val="0"/>
-              </a:spcBef>
-              <a:buSzPct val="25000"/>
-              <a:buNone/>
-            </a:pPr>
-            <a:fld id="{00000000-1234-1234-1234-123412341234}" type="slidenum">
-              <a:rPr lang="en" sz="1200">
-                <a:solidFill>
-                  <a:srgbClr val="888888"/>
-                </a:solidFill>
-                <a:latin typeface="Calibri"/>
-                <a:ea typeface="Calibri"/>
-                <a:cs typeface="Calibri"/>
-                <a:sym typeface="Calibri"/>
-              </a:rPr>
-              <a:t>18</a:t>
-            </a:fld>
-            <a:endParaRPr lang="en" sz="1200">
-              <a:solidFill>
-                <a:srgbClr val="888888"/>
-              </a:solidFill>
-              <a:latin typeface="Calibri"/>
-              <a:ea typeface="Calibri"/>
-              <a:cs typeface="Calibri"/>
-              <a:sym typeface="Calibri"/>
-            </a:endParaRPr>
-          </a:p>
-        </p:txBody>
-      </p:sp>
-      <p:sp>
-        <p:nvSpPr>
-          <p:cNvPr id="236" name="Shape 236"/>
-          <p:cNvSpPr txBox="1">
-            <a:spLocks noGrp="1"/>
-          </p:cNvSpPr>
-          <p:nvPr>
-            <p:ph type="body" idx="1"/>
-          </p:nvPr>
-        </p:nvSpPr>
-        <p:spPr>
-          <a:xfrm>
-            <a:off x="457200" y="1474375"/>
-            <a:ext cx="8229600" cy="4651787"/>
-          </a:xfrm>
-          <a:prstGeom prst="rect">
-            <a:avLst/>
-          </a:prstGeom>
-          <a:noFill/>
-          <a:ln>
-            <a:noFill/>
-          </a:ln>
-        </p:spPr>
-        <p:txBody>
-          <a:bodyPr lIns="91425" tIns="45700" rIns="91425" bIns="45700" anchor="t" anchorCtr="0">
-            <a:noAutofit/>
-          </a:bodyPr>
-          <a:lstStyle/>
-          <a:p>
-            <a:pPr marL="0" marR="0" lvl="0" indent="0" algn="l" rtl="0">
-              <a:spcBef>
-                <a:spcPts val="0"/>
-              </a:spcBef>
-              <a:spcAft>
-                <a:spcPts val="0"/>
-              </a:spcAft>
-              <a:buClr>
-                <a:srgbClr val="34AD91"/>
-              </a:buClr>
-              <a:buSzPct val="25000"/>
-              <a:buFont typeface="Noto Sans Symbols"/>
-              <a:buNone/>
-            </a:pPr>
-            <a:r>
-              <a:rPr lang="en" sz="1200" b="0" i="0" u="none" strike="noStrike" cap="none">
-                <a:solidFill>
-                  <a:schemeClr val="dk1"/>
-                </a:solidFill>
-                <a:latin typeface="Consolas"/>
-                <a:ea typeface="Consolas"/>
-                <a:cs typeface="Consolas"/>
-                <a:sym typeface="Consolas"/>
-              </a:rPr>
-              <a:t>DataStream&lt;Tuple2&lt;String, String&gt;&gt; strings = …</a:t>
-            </a:r>
-            <a:br>
-              <a:rPr lang="en" sz="1200" b="0" i="0" u="none" strike="noStrike" cap="none">
-                <a:solidFill>
-                  <a:schemeClr val="dk1"/>
-                </a:solidFill>
-                <a:latin typeface="Consolas"/>
-                <a:ea typeface="Consolas"/>
-                <a:cs typeface="Consolas"/>
-                <a:sym typeface="Consolas"/>
-              </a:rPr>
-            </a:br>
-            <a:r>
-              <a:rPr lang="en" sz="1200" b="0" i="0" u="none" strike="noStrike" cap="none">
-                <a:solidFill>
-                  <a:schemeClr val="dk1"/>
-                </a:solidFill>
-                <a:latin typeface="Consolas"/>
-                <a:ea typeface="Consolas"/>
-                <a:cs typeface="Consolas"/>
-                <a:sym typeface="Consolas"/>
-              </a:rPr>
-              <a:t>DataStream&lt;Long&gt; lengths = strings</a:t>
-            </a:r>
-            <a:br>
-              <a:rPr lang="en" sz="1200" b="0" i="0" u="none" strike="noStrike" cap="none">
-                <a:solidFill>
-                  <a:schemeClr val="dk1"/>
-                </a:solidFill>
-                <a:latin typeface="Consolas"/>
-                <a:ea typeface="Consolas"/>
-                <a:cs typeface="Consolas"/>
-                <a:sym typeface="Consolas"/>
-              </a:rPr>
-            </a:br>
-            <a:r>
-              <a:rPr lang="en" sz="1200" b="0" i="0" u="none" strike="noStrike" cap="none">
-                <a:solidFill>
-                  <a:schemeClr val="dk1"/>
-                </a:solidFill>
-                <a:latin typeface="Consolas"/>
-                <a:ea typeface="Consolas"/>
-                <a:cs typeface="Consolas"/>
-                <a:sym typeface="Consolas"/>
-              </a:rPr>
-              <a:t>  .keyBy(0)</a:t>
-            </a:r>
-            <a:br>
-              <a:rPr lang="en" sz="1200" b="0" i="0" u="none" strike="noStrike" cap="none">
-                <a:solidFill>
-                  <a:schemeClr val="dk1"/>
-                </a:solidFill>
-                <a:latin typeface="Consolas"/>
-                <a:ea typeface="Consolas"/>
-                <a:cs typeface="Consolas"/>
-                <a:sym typeface="Consolas"/>
-              </a:rPr>
-            </a:br>
-            <a:r>
-              <a:rPr lang="en" sz="1200" b="0" i="0" u="none" strike="noStrike" cap="none">
-                <a:solidFill>
-                  <a:schemeClr val="dk1"/>
-                </a:solidFill>
-                <a:latin typeface="Consolas"/>
-                <a:ea typeface="Consolas"/>
-                <a:cs typeface="Consolas"/>
-                <a:sym typeface="Consolas"/>
-              </a:rPr>
-              <a:t>  .map(new MapWithCounter()); </a:t>
-            </a:r>
-          </a:p>
-          <a:p>
-            <a:pPr marL="0" marR="0" lvl="0" indent="0" algn="l" rtl="0">
-              <a:spcBef>
-                <a:spcPts val="240"/>
-              </a:spcBef>
-              <a:spcAft>
-                <a:spcPts val="0"/>
-              </a:spcAft>
-              <a:buClr>
-                <a:srgbClr val="34AD91"/>
-              </a:buClr>
-              <a:buSzPct val="25000"/>
-              <a:buFont typeface="Noto Sans Symbols"/>
-              <a:buNone/>
-            </a:pPr>
-            <a:endParaRPr sz="1200" b="1" i="0" u="none" strike="noStrike" cap="none">
-              <a:solidFill>
-                <a:srgbClr val="000080"/>
-              </a:solidFill>
-              <a:latin typeface="Consolas"/>
-              <a:ea typeface="Consolas"/>
-              <a:cs typeface="Consolas"/>
-              <a:sym typeface="Consolas"/>
-            </a:endParaRPr>
-          </a:p>
-          <a:p>
-            <a:pPr marL="0" marR="0" lvl="0" indent="0" algn="l" rtl="0">
-              <a:spcBef>
-                <a:spcPts val="240"/>
-              </a:spcBef>
-              <a:spcAft>
-                <a:spcPts val="0"/>
-              </a:spcAft>
-              <a:buClr>
-                <a:srgbClr val="34AD91"/>
-              </a:buClr>
-              <a:buSzPct val="25000"/>
-              <a:buFont typeface="Noto Sans Symbols"/>
-              <a:buNone/>
-            </a:pPr>
-            <a:r>
-              <a:rPr lang="en" sz="1200" b="1" i="0" u="none" strike="noStrike" cap="none">
-                <a:solidFill>
-                  <a:srgbClr val="000080"/>
-                </a:solidFill>
-                <a:latin typeface="Consolas"/>
-                <a:ea typeface="Consolas"/>
-                <a:cs typeface="Consolas"/>
-                <a:sym typeface="Consolas"/>
-              </a:rPr>
-              <a:t>public static class </a:t>
-            </a:r>
-            <a:r>
-              <a:rPr lang="en" sz="1200" b="0" i="0" u="none" strike="noStrike" cap="none">
-                <a:solidFill>
-                  <a:srgbClr val="000000"/>
-                </a:solidFill>
-                <a:latin typeface="Consolas"/>
-                <a:ea typeface="Consolas"/>
-                <a:cs typeface="Consolas"/>
-                <a:sym typeface="Consolas"/>
-              </a:rPr>
-              <a:t>MapWithCounter </a:t>
-            </a:r>
-            <a:r>
-              <a:rPr lang="en" sz="1200" b="1" i="0" u="none" strike="noStrike" cap="none">
-                <a:solidFill>
-                  <a:srgbClr val="000080"/>
-                </a:solidFill>
-                <a:latin typeface="Consolas"/>
-                <a:ea typeface="Consolas"/>
-                <a:cs typeface="Consolas"/>
-                <a:sym typeface="Consolas"/>
-              </a:rPr>
-              <a:t>extends </a:t>
-            </a:r>
-            <a:r>
-              <a:rPr lang="en" sz="1200" b="0" i="0" u="none" strike="noStrike" cap="none">
-                <a:solidFill>
-                  <a:srgbClr val="000000"/>
-                </a:solidFill>
-                <a:latin typeface="Consolas"/>
-                <a:ea typeface="Consolas"/>
-                <a:cs typeface="Consolas"/>
-                <a:sym typeface="Consolas"/>
-              </a:rPr>
-              <a:t>RichMapFunction&lt;Tuple2&lt;String, String&gt;, Long&gt; {</a:t>
-            </a:r>
-          </a:p>
-          <a:p>
-            <a:pPr marL="0" marR="0" lvl="0" indent="0" algn="l" rtl="0">
-              <a:spcBef>
-                <a:spcPts val="240"/>
-              </a:spcBef>
-              <a:spcAft>
-                <a:spcPts val="0"/>
-              </a:spcAft>
-              <a:buClr>
-                <a:srgbClr val="34AD91"/>
-              </a:buClr>
-              <a:buSzPct val="25000"/>
-              <a:buFont typeface="Noto Sans Symbols"/>
-              <a:buNone/>
-            </a:pPr>
-            <a:r>
-              <a:rPr lang="en" sz="1200" b="0" i="0" u="none" strike="noStrike" cap="none">
-                <a:solidFill>
-                  <a:srgbClr val="7F7F7F"/>
-                </a:solidFill>
-                <a:latin typeface="Consolas"/>
-                <a:ea typeface="Consolas"/>
-                <a:cs typeface="Consolas"/>
-                <a:sym typeface="Consolas"/>
-              </a:rPr>
-              <a:t>    // state object</a:t>
-            </a:r>
-          </a:p>
-          <a:p>
-            <a:pPr marL="0" marR="0" lvl="0" indent="0" algn="l" rtl="0">
-              <a:spcBef>
-                <a:spcPts val="240"/>
-              </a:spcBef>
-              <a:spcAft>
-                <a:spcPts val="0"/>
-              </a:spcAft>
-              <a:buClr>
-                <a:srgbClr val="34AD91"/>
-              </a:buClr>
-              <a:buSzPct val="25000"/>
-              <a:buFont typeface="Noto Sans Symbols"/>
-              <a:buNone/>
-            </a:pPr>
-            <a:r>
-              <a:rPr lang="en" sz="1200" b="1" i="0" u="none" strike="noStrike" cap="none">
-                <a:solidFill>
-                  <a:srgbClr val="000000"/>
-                </a:solidFill>
-                <a:latin typeface="Consolas"/>
-                <a:ea typeface="Consolas"/>
-                <a:cs typeface="Consolas"/>
-                <a:sym typeface="Consolas"/>
-              </a:rPr>
-              <a:t> </a:t>
-            </a:r>
-            <a:r>
-              <a:rPr lang="en" sz="1200" b="1" i="0" u="none" strike="noStrike" cap="none">
-                <a:solidFill>
-                  <a:srgbClr val="000080"/>
-                </a:solidFill>
-                <a:latin typeface="Consolas"/>
-                <a:ea typeface="Consolas"/>
-                <a:cs typeface="Consolas"/>
-                <a:sym typeface="Consolas"/>
-              </a:rPr>
-              <a:t>   private </a:t>
-            </a:r>
-            <a:r>
-              <a:rPr lang="en" sz="1200" b="0" i="0" u="none" strike="noStrike" cap="none">
-                <a:solidFill>
-                  <a:srgbClr val="FF0000"/>
-                </a:solidFill>
-                <a:latin typeface="Consolas"/>
-                <a:ea typeface="Consolas"/>
-                <a:cs typeface="Consolas"/>
-                <a:sym typeface="Consolas"/>
-              </a:rPr>
-              <a:t>ValueState&lt;Long&gt; totalLengthByKey</a:t>
-            </a:r>
-            <a:r>
-              <a:rPr lang="en" sz="1200" b="0" i="0" u="none" strike="noStrike" cap="none">
-                <a:solidFill>
-                  <a:srgbClr val="000000"/>
-                </a:solidFill>
-                <a:latin typeface="Consolas"/>
-                <a:ea typeface="Consolas"/>
-                <a:cs typeface="Consolas"/>
-                <a:sym typeface="Consolas"/>
-              </a:rPr>
-              <a:t>;</a:t>
-            </a:r>
-          </a:p>
-          <a:p>
-            <a:pPr marL="0" marR="0" lvl="0" indent="0" algn="l" rtl="0">
-              <a:spcBef>
-                <a:spcPts val="240"/>
-              </a:spcBef>
-              <a:spcAft>
-                <a:spcPts val="0"/>
-              </a:spcAft>
-              <a:buClr>
-                <a:srgbClr val="34AD91"/>
-              </a:buClr>
-              <a:buSzPct val="25000"/>
-              <a:buFont typeface="Noto Sans Symbols"/>
-              <a:buNone/>
-            </a:pPr>
-            <a:r>
-              <a:rPr lang="en" sz="1200" b="0" i="0" u="none" strike="noStrike" cap="none">
-                <a:solidFill>
-                  <a:srgbClr val="000000"/>
-                </a:solidFill>
-                <a:latin typeface="Consolas"/>
-                <a:ea typeface="Consolas"/>
-                <a:cs typeface="Consolas"/>
-                <a:sym typeface="Consolas"/>
-              </a:rPr>
-              <a:t>    </a:t>
-            </a:r>
-          </a:p>
-          <a:p>
-            <a:pPr marL="0" marR="0" lvl="0" indent="0" algn="l" rtl="0">
-              <a:spcBef>
-                <a:spcPts val="240"/>
-              </a:spcBef>
-              <a:spcAft>
-                <a:spcPts val="0"/>
-              </a:spcAft>
-              <a:buClr>
-                <a:srgbClr val="34AD91"/>
-              </a:buClr>
-              <a:buSzPct val="25000"/>
-              <a:buFont typeface="Noto Sans Symbols"/>
-              <a:buNone/>
-            </a:pPr>
-            <a:r>
-              <a:rPr lang="en" sz="1200" b="0" i="0" u="none" strike="noStrike" cap="none">
-                <a:solidFill>
-                  <a:srgbClr val="000000"/>
-                </a:solidFill>
-                <a:latin typeface="Consolas"/>
-                <a:ea typeface="Consolas"/>
-                <a:cs typeface="Consolas"/>
-                <a:sym typeface="Consolas"/>
-              </a:rPr>
-              <a:t>    </a:t>
-            </a:r>
-            <a:r>
-              <a:rPr lang="en" sz="1200" b="0" i="0" u="none" strike="noStrike" cap="none">
-                <a:solidFill>
-                  <a:srgbClr val="808000"/>
-                </a:solidFill>
-                <a:latin typeface="Consolas"/>
-                <a:ea typeface="Consolas"/>
-                <a:cs typeface="Consolas"/>
-                <a:sym typeface="Consolas"/>
-              </a:rPr>
-              <a:t>@Override</a:t>
-            </a:r>
-            <a:br>
-              <a:rPr lang="en" sz="1200" b="0" i="0" u="none" strike="noStrike" cap="none">
-                <a:solidFill>
-                  <a:srgbClr val="808000"/>
-                </a:solidFill>
-                <a:latin typeface="Consolas"/>
-                <a:ea typeface="Consolas"/>
-                <a:cs typeface="Consolas"/>
-                <a:sym typeface="Consolas"/>
-              </a:rPr>
-            </a:br>
-            <a:r>
-              <a:rPr lang="en" sz="1200" b="0" i="0" u="none" strike="noStrike" cap="none">
-                <a:solidFill>
-                  <a:srgbClr val="808000"/>
-                </a:solidFill>
-                <a:latin typeface="Consolas"/>
-                <a:ea typeface="Consolas"/>
-                <a:cs typeface="Consolas"/>
-                <a:sym typeface="Consolas"/>
-              </a:rPr>
-              <a:t>    </a:t>
-            </a:r>
-            <a:r>
-              <a:rPr lang="en" sz="1200" b="1" i="0" u="none" strike="noStrike" cap="none">
-                <a:solidFill>
-                  <a:srgbClr val="000080"/>
-                </a:solidFill>
-                <a:latin typeface="Consolas"/>
-                <a:ea typeface="Consolas"/>
-                <a:cs typeface="Consolas"/>
-                <a:sym typeface="Consolas"/>
-              </a:rPr>
-              <a:t>public void </a:t>
-            </a:r>
-            <a:r>
-              <a:rPr lang="en" sz="1200" b="0" i="0" u="none" strike="noStrike" cap="none">
-                <a:solidFill>
-                  <a:srgbClr val="000000"/>
-                </a:solidFill>
-                <a:latin typeface="Consolas"/>
-                <a:ea typeface="Consolas"/>
-                <a:cs typeface="Consolas"/>
-                <a:sym typeface="Consolas"/>
-              </a:rPr>
-              <a:t>open</a:t>
-            </a:r>
-            <a:r>
-              <a:rPr lang="en" sz="1200" b="1" i="0" u="none" strike="noStrike" cap="none">
-                <a:solidFill>
-                  <a:srgbClr val="000080"/>
-                </a:solidFill>
-                <a:latin typeface="Consolas"/>
-                <a:ea typeface="Consolas"/>
-                <a:cs typeface="Consolas"/>
-                <a:sym typeface="Consolas"/>
-              </a:rPr>
-              <a:t> </a:t>
-            </a:r>
-            <a:r>
-              <a:rPr lang="en" sz="1200" b="0" i="0" u="none" strike="noStrike" cap="none">
-                <a:solidFill>
-                  <a:srgbClr val="000000"/>
-                </a:solidFill>
-                <a:latin typeface="Consolas"/>
-                <a:ea typeface="Consolas"/>
-                <a:cs typeface="Consolas"/>
-                <a:sym typeface="Consolas"/>
-              </a:rPr>
-              <a:t>(Configuration conf) {</a:t>
-            </a:r>
-            <a:br>
-              <a:rPr lang="en" sz="1200" b="0" i="0" u="none" strike="noStrike" cap="none">
-                <a:solidFill>
-                  <a:srgbClr val="000000"/>
-                </a:solidFill>
-                <a:latin typeface="Consolas"/>
-                <a:ea typeface="Consolas"/>
-                <a:cs typeface="Consolas"/>
-                <a:sym typeface="Consolas"/>
-              </a:rPr>
-            </a:br>
-            <a:r>
-              <a:rPr lang="en" sz="1200" b="0" i="0" u="none" strike="noStrike" cap="none">
-                <a:solidFill>
-                  <a:srgbClr val="7F7F7F"/>
-                </a:solidFill>
-                <a:latin typeface="Consolas"/>
-                <a:ea typeface="Consolas"/>
-                <a:cs typeface="Consolas"/>
-                <a:sym typeface="Consolas"/>
-              </a:rPr>
-              <a:t>        // obtain state object</a:t>
-            </a:r>
-          </a:p>
-          <a:p>
-            <a:pPr marL="0" marR="0" lvl="0" indent="0" algn="l" rtl="0">
-              <a:spcBef>
-                <a:spcPts val="240"/>
-              </a:spcBef>
-              <a:spcAft>
-                <a:spcPts val="0"/>
-              </a:spcAft>
-              <a:buClr>
-                <a:srgbClr val="34AD91"/>
-              </a:buClr>
-              <a:buSzPct val="25000"/>
-              <a:buFont typeface="Noto Sans Symbols"/>
-              <a:buNone/>
-            </a:pPr>
-            <a:r>
-              <a:rPr lang="en" sz="1200" b="0" i="0" u="none" strike="noStrike" cap="none">
-                <a:solidFill>
-                  <a:srgbClr val="000000"/>
-                </a:solidFill>
-                <a:latin typeface="Consolas"/>
-                <a:ea typeface="Consolas"/>
-                <a:cs typeface="Consolas"/>
-                <a:sym typeface="Consolas"/>
-              </a:rPr>
-              <a:t>        </a:t>
-            </a:r>
-            <a:r>
-              <a:rPr lang="en" sz="1200" b="0" i="0" u="none" strike="noStrike" cap="none">
-                <a:solidFill>
-                  <a:srgbClr val="FF0000"/>
-                </a:solidFill>
-                <a:latin typeface="Consolas"/>
-                <a:ea typeface="Consolas"/>
-                <a:cs typeface="Consolas"/>
-                <a:sym typeface="Consolas"/>
-              </a:rPr>
-              <a:t>ValueStateDescriptor&lt;Long&gt; descriptor = new ValueStateDescriptor&lt;&gt;(</a:t>
-            </a:r>
-          </a:p>
-          <a:p>
-            <a:pPr marL="0" marR="0" lvl="0" indent="0" algn="l" rtl="0">
-              <a:spcBef>
-                <a:spcPts val="240"/>
-              </a:spcBef>
-              <a:spcAft>
-                <a:spcPts val="0"/>
-              </a:spcAft>
-              <a:buClr>
-                <a:srgbClr val="34AD91"/>
-              </a:buClr>
-              <a:buSzPct val="25000"/>
-              <a:buFont typeface="Noto Sans Symbols"/>
-              <a:buNone/>
-            </a:pPr>
-            <a:r>
-              <a:rPr lang="en" sz="1200" b="0" i="0" u="none" strike="noStrike" cap="none">
-                <a:solidFill>
-                  <a:srgbClr val="FF0000"/>
-                </a:solidFill>
-                <a:latin typeface="Consolas"/>
-                <a:ea typeface="Consolas"/>
-                <a:cs typeface="Consolas"/>
-                <a:sym typeface="Consolas"/>
-              </a:rPr>
-              <a:t>            "totalLengthByKey", Long.class, 0L);</a:t>
-            </a:r>
-          </a:p>
-          <a:p>
-            <a:pPr marL="0" marR="0" lvl="0" indent="0" algn="l" rtl="0">
-              <a:spcBef>
-                <a:spcPts val="240"/>
-              </a:spcBef>
-              <a:spcAft>
-                <a:spcPts val="0"/>
-              </a:spcAft>
-              <a:buClr>
-                <a:srgbClr val="34AD91"/>
-              </a:buClr>
-              <a:buSzPct val="25000"/>
-              <a:buFont typeface="Noto Sans Symbols"/>
-              <a:buNone/>
-            </a:pPr>
-            <a:r>
-              <a:rPr lang="en" sz="1200" b="0" i="0" u="none" strike="noStrike" cap="none">
-                <a:solidFill>
-                  <a:srgbClr val="000000"/>
-                </a:solidFill>
-                <a:latin typeface="Consolas"/>
-                <a:ea typeface="Consolas"/>
-                <a:cs typeface="Consolas"/>
-                <a:sym typeface="Consolas"/>
-              </a:rPr>
-              <a:t>        totalLengthByKey = getRuntimeContext().</a:t>
-            </a:r>
-            <a:r>
-              <a:rPr lang="en" sz="1200" b="0" i="0" u="none" strike="noStrike" cap="none">
-                <a:solidFill>
-                  <a:srgbClr val="FF0000"/>
-                </a:solidFill>
-                <a:latin typeface="Consolas"/>
-                <a:ea typeface="Consolas"/>
-                <a:cs typeface="Consolas"/>
-                <a:sym typeface="Consolas"/>
-              </a:rPr>
-              <a:t>getState(descriptor)</a:t>
-            </a:r>
-            <a:r>
-              <a:rPr lang="en" sz="1200" b="0" i="0" u="none" strike="noStrike" cap="none">
-                <a:solidFill>
-                  <a:srgbClr val="000000"/>
-                </a:solidFill>
-                <a:latin typeface="Consolas"/>
-                <a:ea typeface="Consolas"/>
-                <a:cs typeface="Consolas"/>
-                <a:sym typeface="Consolas"/>
-              </a:rPr>
-              <a:t>;</a:t>
-            </a:r>
-          </a:p>
-          <a:p>
-            <a:pPr marL="0" marR="0" lvl="0" indent="0" algn="l" rtl="0">
-              <a:spcBef>
-                <a:spcPts val="240"/>
-              </a:spcBef>
-              <a:spcAft>
-                <a:spcPts val="0"/>
-              </a:spcAft>
-              <a:buClr>
-                <a:srgbClr val="34AD91"/>
-              </a:buClr>
-              <a:buSzPct val="25000"/>
-              <a:buFont typeface="Noto Sans Symbols"/>
-              <a:buNone/>
-            </a:pPr>
-            <a:r>
-              <a:rPr lang="en" sz="1200" b="0" i="0" u="none" strike="noStrike" cap="none">
-                <a:solidFill>
-                  <a:srgbClr val="000000"/>
-                </a:solidFill>
-                <a:latin typeface="Consolas"/>
-                <a:ea typeface="Consolas"/>
-                <a:cs typeface="Consolas"/>
-                <a:sym typeface="Consolas"/>
-              </a:rPr>
-              <a:t>    }</a:t>
-            </a:r>
-          </a:p>
-          <a:p>
-            <a:pPr marL="0" marR="0" lvl="0" indent="0" algn="l" rtl="0">
-              <a:spcBef>
-                <a:spcPts val="240"/>
-              </a:spcBef>
-              <a:spcAft>
-                <a:spcPts val="0"/>
-              </a:spcAft>
-              <a:buClr>
-                <a:srgbClr val="34AD91"/>
-              </a:buClr>
-              <a:buSzPct val="25000"/>
-              <a:buFont typeface="Noto Sans Symbols"/>
-              <a:buNone/>
-            </a:pPr>
-            <a:r>
-              <a:rPr lang="en" sz="1200" b="0" i="0" u="none" strike="noStrike" cap="none">
-                <a:solidFill>
-                  <a:srgbClr val="000000"/>
-                </a:solidFill>
-                <a:latin typeface="Consolas"/>
-                <a:ea typeface="Consolas"/>
-                <a:cs typeface="Consolas"/>
-                <a:sym typeface="Consolas"/>
-              </a:rPr>
-              <a:t/>
-            </a:r>
-            <a:br>
-              <a:rPr lang="en" sz="1200" b="0" i="0" u="none" strike="noStrike" cap="none">
-                <a:solidFill>
-                  <a:srgbClr val="000000"/>
-                </a:solidFill>
-                <a:latin typeface="Consolas"/>
-                <a:ea typeface="Consolas"/>
-                <a:cs typeface="Consolas"/>
-                <a:sym typeface="Consolas"/>
-              </a:rPr>
-            </a:br>
-            <a:r>
-              <a:rPr lang="en" sz="1200" b="0" i="0" u="none" strike="noStrike" cap="none">
-                <a:solidFill>
-                  <a:srgbClr val="000000"/>
-                </a:solidFill>
-                <a:latin typeface="Consolas"/>
-                <a:ea typeface="Consolas"/>
-                <a:cs typeface="Consolas"/>
-                <a:sym typeface="Consolas"/>
-              </a:rPr>
-              <a:t>    </a:t>
-            </a:r>
-            <a:r>
-              <a:rPr lang="en" sz="1200" b="0" i="0" u="none" strike="noStrike" cap="none">
-                <a:solidFill>
-                  <a:srgbClr val="808000"/>
-                </a:solidFill>
-                <a:latin typeface="Consolas"/>
-                <a:ea typeface="Consolas"/>
-                <a:cs typeface="Consolas"/>
-                <a:sym typeface="Consolas"/>
-              </a:rPr>
-              <a:t>@Override</a:t>
-            </a:r>
-            <a:br>
-              <a:rPr lang="en" sz="1200" b="0" i="0" u="none" strike="noStrike" cap="none">
-                <a:solidFill>
-                  <a:srgbClr val="808000"/>
-                </a:solidFill>
-                <a:latin typeface="Consolas"/>
-                <a:ea typeface="Consolas"/>
-                <a:cs typeface="Consolas"/>
-                <a:sym typeface="Consolas"/>
-              </a:rPr>
-            </a:br>
-            <a:r>
-              <a:rPr lang="en" sz="1200" b="0" i="0" u="none" strike="noStrike" cap="none">
-                <a:solidFill>
-                  <a:srgbClr val="808000"/>
-                </a:solidFill>
-                <a:latin typeface="Consolas"/>
-                <a:ea typeface="Consolas"/>
-                <a:cs typeface="Consolas"/>
-                <a:sym typeface="Consolas"/>
-              </a:rPr>
-              <a:t>    </a:t>
-            </a:r>
-            <a:r>
-              <a:rPr lang="en" sz="1200" b="1" i="0" u="none" strike="noStrike" cap="none">
-                <a:solidFill>
-                  <a:srgbClr val="000080"/>
-                </a:solidFill>
-                <a:latin typeface="Consolas"/>
-                <a:ea typeface="Consolas"/>
-                <a:cs typeface="Consolas"/>
-                <a:sym typeface="Consolas"/>
-              </a:rPr>
-              <a:t>public </a:t>
-            </a:r>
-            <a:r>
-              <a:rPr lang="en" sz="1200" b="0" i="0" u="none" strike="noStrike" cap="none">
-                <a:solidFill>
-                  <a:srgbClr val="000000"/>
-                </a:solidFill>
-                <a:latin typeface="Consolas"/>
-                <a:ea typeface="Consolas"/>
-                <a:cs typeface="Consolas"/>
-                <a:sym typeface="Consolas"/>
-              </a:rPr>
-              <a:t>Long</a:t>
-            </a:r>
-            <a:r>
-              <a:rPr lang="en" sz="1200" b="1" i="0" u="none" strike="noStrike" cap="none">
-                <a:solidFill>
-                  <a:srgbClr val="000080"/>
-                </a:solidFill>
-                <a:latin typeface="Consolas"/>
-                <a:ea typeface="Consolas"/>
-                <a:cs typeface="Consolas"/>
-                <a:sym typeface="Consolas"/>
-              </a:rPr>
-              <a:t> </a:t>
-            </a:r>
-            <a:r>
-              <a:rPr lang="en" sz="1200" b="0" i="0" u="none" strike="noStrike" cap="none">
-                <a:solidFill>
-                  <a:srgbClr val="000000"/>
-                </a:solidFill>
-                <a:latin typeface="Consolas"/>
-                <a:ea typeface="Consolas"/>
-                <a:cs typeface="Consolas"/>
-                <a:sym typeface="Consolas"/>
-              </a:rPr>
-              <a:t>map</a:t>
-            </a:r>
-            <a:r>
-              <a:rPr lang="en" sz="1200" b="1" i="0" u="none" strike="noStrike" cap="none">
-                <a:solidFill>
-                  <a:srgbClr val="000080"/>
-                </a:solidFill>
-                <a:latin typeface="Consolas"/>
-                <a:ea typeface="Consolas"/>
-                <a:cs typeface="Consolas"/>
-                <a:sym typeface="Consolas"/>
-              </a:rPr>
-              <a:t> </a:t>
-            </a:r>
-            <a:r>
-              <a:rPr lang="en" sz="1200" b="0" i="0" u="none" strike="noStrike" cap="none">
-                <a:solidFill>
-                  <a:srgbClr val="000000"/>
-                </a:solidFill>
-                <a:latin typeface="Consolas"/>
-                <a:ea typeface="Consolas"/>
-                <a:cs typeface="Consolas"/>
-                <a:sym typeface="Consolas"/>
-              </a:rPr>
-              <a:t>(Tuple2&lt;String, String&gt; value) </a:t>
-            </a:r>
-            <a:r>
-              <a:rPr lang="en" sz="1200" b="1" i="0" u="none" strike="noStrike" cap="none">
-                <a:solidFill>
-                  <a:srgbClr val="000080"/>
-                </a:solidFill>
-                <a:latin typeface="Consolas"/>
-                <a:ea typeface="Consolas"/>
-                <a:cs typeface="Consolas"/>
-                <a:sym typeface="Consolas"/>
-              </a:rPr>
-              <a:t>throws</a:t>
-            </a:r>
-            <a:r>
-              <a:rPr lang="en" sz="1200" b="0" i="0" u="none" strike="noStrike" cap="none">
-                <a:solidFill>
-                  <a:srgbClr val="000000"/>
-                </a:solidFill>
-                <a:latin typeface="Consolas"/>
-                <a:ea typeface="Consolas"/>
-                <a:cs typeface="Consolas"/>
-                <a:sym typeface="Consolas"/>
-              </a:rPr>
-              <a:t> Exception {</a:t>
-            </a:r>
-          </a:p>
-          <a:p>
-            <a:pPr marL="0" marR="0" lvl="0" indent="0" algn="l" rtl="0">
-              <a:spcBef>
-                <a:spcPts val="240"/>
-              </a:spcBef>
-              <a:spcAft>
-                <a:spcPts val="0"/>
-              </a:spcAft>
-              <a:buClr>
-                <a:srgbClr val="34AD91"/>
-              </a:buClr>
-              <a:buSzPct val="25000"/>
-              <a:buFont typeface="Noto Sans Symbols"/>
-              <a:buNone/>
-            </a:pPr>
-            <a:r>
-              <a:rPr lang="en" sz="1200" b="0" i="0" u="none" strike="noStrike" cap="none">
-                <a:solidFill>
-                  <a:srgbClr val="000000"/>
-                </a:solidFill>
-                <a:latin typeface="Consolas"/>
-                <a:ea typeface="Consolas"/>
-                <a:cs typeface="Consolas"/>
-                <a:sym typeface="Consolas"/>
-              </a:rPr>
-              <a:t>        long length = </a:t>
-            </a:r>
-            <a:r>
-              <a:rPr lang="en" sz="1200" b="0" i="0" u="none" strike="noStrike" cap="none">
-                <a:solidFill>
-                  <a:srgbClr val="FF0000"/>
-                </a:solidFill>
-                <a:latin typeface="Consolas"/>
-                <a:ea typeface="Consolas"/>
-                <a:cs typeface="Consolas"/>
-                <a:sym typeface="Consolas"/>
-              </a:rPr>
-              <a:t>totalLengthByKey.value()</a:t>
-            </a:r>
-            <a:r>
-              <a:rPr lang="en" sz="1200" b="0" i="0" u="none" strike="noStrike" cap="none">
-                <a:solidFill>
-                  <a:srgbClr val="000000"/>
-                </a:solidFill>
-                <a:latin typeface="Consolas"/>
-                <a:ea typeface="Consolas"/>
-                <a:cs typeface="Consolas"/>
-                <a:sym typeface="Consolas"/>
-              </a:rPr>
-              <a:t>;    </a:t>
-            </a:r>
-            <a:r>
-              <a:rPr lang="en" sz="1200" b="0" i="0" u="none" strike="noStrike" cap="none">
-                <a:solidFill>
-                  <a:srgbClr val="7F7F7F"/>
-                </a:solidFill>
-                <a:latin typeface="Consolas"/>
-                <a:ea typeface="Consolas"/>
-                <a:cs typeface="Consolas"/>
-                <a:sym typeface="Consolas"/>
-              </a:rPr>
-              <a:t>// fetch state for current key</a:t>
-            </a:r>
-          </a:p>
-          <a:p>
-            <a:pPr marL="0" marR="0" lvl="0" indent="0" algn="l" rtl="0">
-              <a:spcBef>
-                <a:spcPts val="240"/>
-              </a:spcBef>
-              <a:spcAft>
-                <a:spcPts val="0"/>
-              </a:spcAft>
-              <a:buClr>
-                <a:srgbClr val="34AD91"/>
-              </a:buClr>
-              <a:buSzPct val="25000"/>
-              <a:buFont typeface="Noto Sans Symbols"/>
-              <a:buNone/>
-            </a:pPr>
-            <a:r>
-              <a:rPr lang="en" sz="1200" b="0" i="0" u="none" strike="noStrike" cap="none">
-                <a:solidFill>
-                  <a:srgbClr val="000000"/>
-                </a:solidFill>
-                <a:latin typeface="Consolas"/>
-                <a:ea typeface="Consolas"/>
-                <a:cs typeface="Consolas"/>
-                <a:sym typeface="Consolas"/>
-              </a:rPr>
-              <a:t>        long newTotalLength = length + value.f1.length();</a:t>
-            </a:r>
-          </a:p>
-          <a:p>
-            <a:pPr marL="0" marR="0" lvl="0" indent="0" algn="l" rtl="0">
-              <a:spcBef>
-                <a:spcPts val="240"/>
-              </a:spcBef>
-              <a:spcAft>
-                <a:spcPts val="0"/>
-              </a:spcAft>
-              <a:buClr>
-                <a:srgbClr val="34AD91"/>
-              </a:buClr>
-              <a:buSzPct val="25000"/>
-              <a:buFont typeface="Noto Sans Symbols"/>
-              <a:buNone/>
-            </a:pPr>
-            <a:r>
-              <a:rPr lang="en" sz="1200" b="0" i="0" u="none" strike="noStrike" cap="none">
-                <a:solidFill>
-                  <a:srgbClr val="FF0000"/>
-                </a:solidFill>
-                <a:latin typeface="Consolas"/>
-                <a:ea typeface="Consolas"/>
-                <a:cs typeface="Consolas"/>
-                <a:sym typeface="Consolas"/>
-              </a:rPr>
-              <a:t>        totalLengthByKey.update(newTotalLength);   </a:t>
-            </a:r>
-            <a:r>
-              <a:rPr lang="en" sz="1200" b="0" i="0" u="none" strike="noStrike" cap="none">
-                <a:solidFill>
-                  <a:srgbClr val="7F7F7F"/>
-                </a:solidFill>
-                <a:latin typeface="Consolas"/>
-                <a:ea typeface="Consolas"/>
-                <a:cs typeface="Consolas"/>
-                <a:sym typeface="Consolas"/>
-              </a:rPr>
-              <a:t>// update state of current key</a:t>
-            </a:r>
-          </a:p>
-          <a:p>
-            <a:pPr marL="0" marR="0" lvl="0" indent="0" algn="l" rtl="0">
-              <a:spcBef>
-                <a:spcPts val="240"/>
-              </a:spcBef>
-              <a:spcAft>
-                <a:spcPts val="0"/>
-              </a:spcAft>
-              <a:buClr>
-                <a:srgbClr val="34AD91"/>
-              </a:buClr>
-              <a:buSzPct val="25000"/>
-              <a:buFont typeface="Noto Sans Symbols"/>
-              <a:buNone/>
-            </a:pPr>
-            <a:r>
-              <a:rPr lang="en" sz="1200" b="0" i="0" u="none" strike="noStrike" cap="none">
-                <a:solidFill>
-                  <a:srgbClr val="000000"/>
-                </a:solidFill>
-                <a:latin typeface="Consolas"/>
-                <a:ea typeface="Consolas"/>
-                <a:cs typeface="Consolas"/>
-                <a:sym typeface="Consolas"/>
-              </a:rPr>
-              <a:t>        </a:t>
-            </a:r>
-            <a:r>
-              <a:rPr lang="en" sz="1200" b="1" i="0" u="none" strike="noStrike" cap="none">
-                <a:solidFill>
-                  <a:srgbClr val="000080"/>
-                </a:solidFill>
-                <a:latin typeface="Consolas"/>
-                <a:ea typeface="Consolas"/>
-                <a:cs typeface="Consolas"/>
-                <a:sym typeface="Consolas"/>
-              </a:rPr>
-              <a:t>return</a:t>
-            </a:r>
-            <a:r>
-              <a:rPr lang="en" sz="1200" b="0" i="0" u="none" strike="noStrike" cap="none">
-                <a:solidFill>
-                  <a:srgbClr val="000000"/>
-                </a:solidFill>
-                <a:latin typeface="Consolas"/>
-                <a:ea typeface="Consolas"/>
-                <a:cs typeface="Consolas"/>
-                <a:sym typeface="Consolas"/>
-              </a:rPr>
-              <a:t> totalLengthByKey.value();</a:t>
-            </a:r>
-          </a:p>
-          <a:p>
-            <a:pPr marL="0" marR="0" lvl="0" indent="0" algn="l" rtl="0">
-              <a:spcBef>
-                <a:spcPts val="240"/>
-              </a:spcBef>
-              <a:spcAft>
-                <a:spcPts val="0"/>
-              </a:spcAft>
-              <a:buClr>
-                <a:srgbClr val="34AD91"/>
-              </a:buClr>
-              <a:buSzPct val="25000"/>
-              <a:buFont typeface="Noto Sans Symbols"/>
-              <a:buNone/>
-            </a:pPr>
-            <a:r>
-              <a:rPr lang="en" sz="1200" b="0" i="0" u="none" strike="noStrike" cap="none">
-                <a:solidFill>
-                  <a:srgbClr val="000000"/>
-                </a:solidFill>
-                <a:latin typeface="Consolas"/>
-                <a:ea typeface="Consolas"/>
-                <a:cs typeface="Consolas"/>
-                <a:sym typeface="Consolas"/>
-              </a:rPr>
-              <a:t>    } </a:t>
-            </a:r>
-          </a:p>
-          <a:p>
-            <a:pPr marL="0" marR="0" lvl="0" indent="0" algn="l" rtl="0">
-              <a:spcBef>
-                <a:spcPts val="240"/>
-              </a:spcBef>
-              <a:buClr>
-                <a:srgbClr val="34AD91"/>
-              </a:buClr>
-              <a:buSzPct val="25000"/>
-              <a:buFont typeface="Noto Sans Symbols"/>
-              <a:buNone/>
-            </a:pPr>
-            <a:r>
-              <a:rPr lang="en" sz="1200" b="0" i="0" u="none" strike="noStrike" cap="none">
-                <a:solidFill>
-                  <a:srgbClr val="000000"/>
-                </a:solidFill>
-                <a:latin typeface="Consolas"/>
-                <a:ea typeface="Consolas"/>
-                <a:cs typeface="Consolas"/>
-                <a:sym typeface="Consolas"/>
-              </a:rPr>
-              <a:t>}</a:t>
-            </a:r>
-          </a:p>
-        </p:txBody>
-      </p:sp>
-    </p:spTree>
-  </p:cSld>
-  <p:clrMapOvr>
-    <a:masterClrMapping/>
-  </p:clrMapOvr>
-</p:sld>
-</file>
-
-<file path=ppt/slides/slide19.xml><?xml version="1.0" encoding="utf-8"?>
-<p:sld xmlns:a="http://schemas.openxmlformats.org/drawingml/2006/main" xmlns:r="http://schemas.openxmlformats.org/officeDocument/2006/relationships" xmlns:p="http://schemas.openxmlformats.org/presentationml/2006/main">
-  <p:cSld>
-    <p:spTree>
-      <p:nvGrpSpPr>
-        <p:cNvPr id="1" name="Shape 241"/>
-        <p:cNvGrpSpPr/>
-        <p:nvPr/>
-      </p:nvGrpSpPr>
-      <p:grpSpPr>
-        <a:xfrm>
-          <a:off x="0" y="0"/>
-          <a:ext cx="0" cy="0"/>
-          <a:chOff x="0" y="0"/>
-          <a:chExt cx="0" cy="0"/>
-        </a:xfrm>
-      </p:grpSpPr>
-      <p:sp>
-        <p:nvSpPr>
-          <p:cNvPr id="242" name="Shape 242"/>
-          <p:cNvSpPr txBox="1">
-            <a:spLocks noGrp="1"/>
-          </p:cNvSpPr>
-          <p:nvPr>
-            <p:ph type="title"/>
-          </p:nvPr>
-        </p:nvSpPr>
-        <p:spPr>
-          <a:xfrm>
-            <a:off x="722312" y="4406900"/>
-            <a:ext cx="7772400" cy="1362075"/>
-          </a:xfrm>
-          <a:prstGeom prst="rect">
-            <a:avLst/>
-          </a:prstGeom>
-          <a:noFill/>
-          <a:ln>
-            <a:noFill/>
-          </a:ln>
-        </p:spPr>
-        <p:txBody>
-          <a:bodyPr lIns="91425" tIns="45700" rIns="91425" bIns="45700" anchor="t" anchorCtr="0">
-            <a:noAutofit/>
-          </a:bodyPr>
-          <a:lstStyle/>
-          <a:p>
-            <a:pPr marL="0" marR="0" lvl="0" indent="0" algn="l" rtl="0">
-              <a:spcBef>
-                <a:spcPts val="0"/>
-              </a:spcBef>
-              <a:buClr>
-                <a:srgbClr val="FFFFFF"/>
-              </a:buClr>
-              <a:buSzPct val="25000"/>
-              <a:buFont typeface="Calibri"/>
-              <a:buNone/>
-            </a:pPr>
-            <a:r>
-              <a:rPr lang="en" sz="4000" b="1" i="0" u="none" strike="noStrike" cap="none">
-                <a:solidFill>
-                  <a:srgbClr val="FFFFFF"/>
-                </a:solidFill>
-                <a:latin typeface="Calibri"/>
-                <a:ea typeface="Calibri"/>
-                <a:cs typeface="Calibri"/>
-                <a:sym typeface="Calibri"/>
-              </a:rPr>
-              <a:t>State Backends</a:t>
-            </a:r>
-          </a:p>
-        </p:txBody>
-      </p:sp>
-      <p:sp>
-        <p:nvSpPr>
-          <p:cNvPr id="243" name="Shape 243"/>
-          <p:cNvSpPr txBox="1">
-            <a:spLocks noGrp="1"/>
-          </p:cNvSpPr>
-          <p:nvPr>
-            <p:ph type="body" idx="1"/>
-          </p:nvPr>
-        </p:nvSpPr>
-        <p:spPr>
-          <a:xfrm>
-            <a:off x="722312" y="2906713"/>
-            <a:ext cx="7772400" cy="1500187"/>
-          </a:xfrm>
-          <a:prstGeom prst="rect">
-            <a:avLst/>
-          </a:prstGeom>
-          <a:noFill/>
-          <a:ln>
-            <a:noFill/>
-          </a:ln>
-        </p:spPr>
-        <p:txBody>
-          <a:bodyPr lIns="91425" tIns="45700" rIns="91425" bIns="45700" anchor="b" anchorCtr="0">
-            <a:noAutofit/>
-          </a:bodyPr>
-          <a:lstStyle/>
-          <a:p>
-            <a:pPr marL="0" marR="0" lvl="0" indent="0" algn="l" rtl="0">
-              <a:spcBef>
-                <a:spcPts val="0"/>
-              </a:spcBef>
-              <a:buClr>
-                <a:srgbClr val="34AD91"/>
-              </a:buClr>
-              <a:buSzPct val="25000"/>
-              <a:buFont typeface="Noto Sans Symbols"/>
-              <a:buNone/>
-            </a:pPr>
-            <a:endParaRPr sz="2000" b="0" i="0" u="none" strike="noStrike" cap="none">
-              <a:solidFill>
-                <a:srgbClr val="FFFFFF"/>
-              </a:solidFill>
-              <a:latin typeface="Calibri"/>
-              <a:ea typeface="Calibri"/>
-              <a:cs typeface="Calibri"/>
-              <a:sym typeface="Calibri"/>
-            </a:endParaRPr>
-          </a:p>
-        </p:txBody>
-      </p:sp>
-      <p:sp>
-        <p:nvSpPr>
-          <p:cNvPr id="244" name="Shape 244"/>
-          <p:cNvSpPr txBox="1">
-            <a:spLocks noGrp="1"/>
-          </p:cNvSpPr>
-          <p:nvPr>
-            <p:ph type="sldNum" idx="12"/>
-          </p:nvPr>
-        </p:nvSpPr>
-        <p:spPr>
-          <a:xfrm>
-            <a:off x="6553200" y="6356350"/>
-            <a:ext cx="2133599" cy="365125"/>
-          </a:xfrm>
-          <a:prstGeom prst="rect">
-            <a:avLst/>
-          </a:prstGeom>
-          <a:noFill/>
-          <a:ln>
-            <a:noFill/>
-          </a:ln>
-        </p:spPr>
-        <p:txBody>
-          <a:bodyPr lIns="91425" tIns="45700" rIns="91425" bIns="45700" anchor="ctr" anchorCtr="0">
-            <a:noAutofit/>
-          </a:bodyPr>
-          <a:lstStyle/>
-          <a:p>
-            <a:pPr marL="0" marR="0" lvl="0" indent="0" algn="r" rtl="0">
-              <a:spcBef>
-                <a:spcPts val="0"/>
-              </a:spcBef>
-              <a:buSzPct val="25000"/>
-              <a:buNone/>
-            </a:pPr>
-            <a:fld id="{00000000-1234-1234-1234-123412341234}" type="slidenum">
-              <a:rPr lang="en" sz="1200">
-                <a:solidFill>
-                  <a:srgbClr val="888888"/>
-                </a:solidFill>
-                <a:latin typeface="Calibri"/>
-                <a:ea typeface="Calibri"/>
-                <a:cs typeface="Calibri"/>
-                <a:sym typeface="Calibri"/>
-              </a:rPr>
-              <a:t>19</a:t>
-            </a:fld>
-            <a:endParaRPr lang="en" sz="1200">
-              <a:solidFill>
-                <a:srgbClr val="888888"/>
-              </a:solidFill>
-              <a:latin typeface="Calibri"/>
-              <a:ea typeface="Calibri"/>
-              <a:cs typeface="Calibri"/>
-              <a:sym typeface="Calibri"/>
-            </a:endParaRPr>
-          </a:p>
-        </p:txBody>
-      </p:sp>
-    </p:spTree>
   </p:cSld>
   <p:clrMapOvr>
     <a:masterClrMapping/>
@@ -23938,6 +22883,1375 @@
   <p:cSld>
     <p:spTree>
       <p:nvGrpSpPr>
+        <p:cNvPr id="1" name="Shape 233"/>
+        <p:cNvGrpSpPr/>
+        <p:nvPr/>
+      </p:nvGrpSpPr>
+      <p:grpSpPr>
+        <a:xfrm>
+          <a:off x="0" y="0"/>
+          <a:ext cx="0" cy="0"/>
+          <a:chOff x="0" y="0"/>
+          <a:chExt cx="0" cy="0"/>
+        </a:xfrm>
+      </p:grpSpPr>
+      <p:sp>
+        <p:nvSpPr>
+          <p:cNvPr id="234" name="Shape 234"/>
+          <p:cNvSpPr txBox="1">
+            <a:spLocks noGrp="1"/>
+          </p:cNvSpPr>
+          <p:nvPr>
+            <p:ph type="title"/>
+          </p:nvPr>
+        </p:nvSpPr>
+        <p:spPr>
+          <a:xfrm>
+            <a:off x="457200" y="274637"/>
+            <a:ext cx="7474684" cy="898405"/>
+          </a:xfrm>
+          <a:prstGeom prst="rect">
+            <a:avLst/>
+          </a:prstGeom>
+          <a:noFill/>
+          <a:ln>
+            <a:noFill/>
+          </a:ln>
+        </p:spPr>
+        <p:txBody>
+          <a:bodyPr lIns="91425" tIns="45700" rIns="91425" bIns="45700" anchor="ctr" anchorCtr="0">
+            <a:noAutofit/>
+          </a:bodyPr>
+          <a:lstStyle/>
+          <a:p>
+            <a:pPr marL="0" marR="0" lvl="0" indent="0" algn="l" rtl="0">
+              <a:spcBef>
+                <a:spcPts val="0"/>
+              </a:spcBef>
+              <a:buClr>
+                <a:schemeClr val="dk1"/>
+              </a:buClr>
+              <a:buSzPct val="25000"/>
+              <a:buFont typeface="Calibri"/>
+              <a:buNone/>
+            </a:pPr>
+            <a:r>
+              <a:rPr lang="en" sz="4400" b="0" i="0" u="none" strike="noStrike" cap="none" dirty="0">
+                <a:solidFill>
+                  <a:schemeClr val="dk1"/>
+                </a:solidFill>
+                <a:latin typeface="Calibri"/>
+                <a:ea typeface="Calibri"/>
+                <a:cs typeface="Calibri"/>
+                <a:sym typeface="Calibri"/>
+              </a:rPr>
+              <a:t>Using Key-Partitioned State</a:t>
+            </a:r>
+          </a:p>
+        </p:txBody>
+      </p:sp>
+      <p:sp>
+        <p:nvSpPr>
+          <p:cNvPr id="235" name="Shape 235"/>
+          <p:cNvSpPr txBox="1">
+            <a:spLocks noGrp="1"/>
+          </p:cNvSpPr>
+          <p:nvPr>
+            <p:ph type="sldNum" idx="12"/>
+          </p:nvPr>
+        </p:nvSpPr>
+        <p:spPr>
+          <a:xfrm>
+            <a:off x="6553200" y="6356350"/>
+            <a:ext cx="2133599" cy="365125"/>
+          </a:xfrm>
+          <a:prstGeom prst="rect">
+            <a:avLst/>
+          </a:prstGeom>
+          <a:noFill/>
+          <a:ln>
+            <a:noFill/>
+          </a:ln>
+        </p:spPr>
+        <p:txBody>
+          <a:bodyPr lIns="91425" tIns="45700" rIns="91425" bIns="45700" anchor="ctr" anchorCtr="0">
+            <a:noAutofit/>
+          </a:bodyPr>
+          <a:lstStyle/>
+          <a:p>
+            <a:pPr marL="0" marR="0" lvl="0" indent="0" algn="r" rtl="0">
+              <a:spcBef>
+                <a:spcPts val="0"/>
+              </a:spcBef>
+              <a:buSzPct val="25000"/>
+              <a:buNone/>
+            </a:pPr>
+            <a:fld id="{00000000-1234-1234-1234-123412341234}" type="slidenum">
+              <a:rPr lang="en" sz="1200">
+                <a:solidFill>
+                  <a:srgbClr val="888888"/>
+                </a:solidFill>
+                <a:latin typeface="Calibri"/>
+                <a:ea typeface="Calibri"/>
+                <a:cs typeface="Calibri"/>
+                <a:sym typeface="Calibri"/>
+              </a:rPr>
+              <a:t>20</a:t>
+            </a:fld>
+            <a:endParaRPr lang="en" sz="1200">
+              <a:solidFill>
+                <a:srgbClr val="888888"/>
+              </a:solidFill>
+              <a:latin typeface="Calibri"/>
+              <a:ea typeface="Calibri"/>
+              <a:cs typeface="Calibri"/>
+              <a:sym typeface="Calibri"/>
+            </a:endParaRPr>
+          </a:p>
+        </p:txBody>
+      </p:sp>
+      <p:sp>
+        <p:nvSpPr>
+          <p:cNvPr id="236" name="Shape 236"/>
+          <p:cNvSpPr txBox="1">
+            <a:spLocks noGrp="1"/>
+          </p:cNvSpPr>
+          <p:nvPr>
+            <p:ph type="body" idx="1"/>
+          </p:nvPr>
+        </p:nvSpPr>
+        <p:spPr>
+          <a:xfrm>
+            <a:off x="457200" y="1474375"/>
+            <a:ext cx="8229600" cy="4651787"/>
+          </a:xfrm>
+          <a:prstGeom prst="rect">
+            <a:avLst/>
+          </a:prstGeom>
+          <a:noFill/>
+          <a:ln>
+            <a:noFill/>
+          </a:ln>
+        </p:spPr>
+        <p:txBody>
+          <a:bodyPr lIns="91425" tIns="45700" rIns="91425" bIns="45700" anchor="t" anchorCtr="0">
+            <a:noAutofit/>
+          </a:bodyPr>
+          <a:lstStyle/>
+          <a:p>
+            <a:pPr marL="0" marR="0" lvl="0" indent="0" algn="l" rtl="0">
+              <a:spcBef>
+                <a:spcPts val="0"/>
+              </a:spcBef>
+              <a:spcAft>
+                <a:spcPts val="0"/>
+              </a:spcAft>
+              <a:buClr>
+                <a:srgbClr val="34AD91"/>
+              </a:buClr>
+              <a:buSzPct val="25000"/>
+              <a:buFont typeface="Noto Sans Symbols"/>
+              <a:buNone/>
+            </a:pPr>
+            <a:r>
+              <a:rPr lang="en" sz="1200" b="0" i="0" u="none" strike="noStrike" cap="none">
+                <a:solidFill>
+                  <a:schemeClr val="dk1"/>
+                </a:solidFill>
+                <a:latin typeface="Consolas"/>
+                <a:ea typeface="Consolas"/>
+                <a:cs typeface="Consolas"/>
+                <a:sym typeface="Consolas"/>
+              </a:rPr>
+              <a:t>DataStream&lt;Tuple2&lt;String, String&gt;&gt; strings = …</a:t>
+            </a:r>
+            <a:br>
+              <a:rPr lang="en" sz="1200" b="0" i="0" u="none" strike="noStrike" cap="none">
+                <a:solidFill>
+                  <a:schemeClr val="dk1"/>
+                </a:solidFill>
+                <a:latin typeface="Consolas"/>
+                <a:ea typeface="Consolas"/>
+                <a:cs typeface="Consolas"/>
+                <a:sym typeface="Consolas"/>
+              </a:rPr>
+            </a:br>
+            <a:r>
+              <a:rPr lang="en" sz="1200" b="0" i="0" u="none" strike="noStrike" cap="none">
+                <a:solidFill>
+                  <a:schemeClr val="dk1"/>
+                </a:solidFill>
+                <a:latin typeface="Consolas"/>
+                <a:ea typeface="Consolas"/>
+                <a:cs typeface="Consolas"/>
+                <a:sym typeface="Consolas"/>
+              </a:rPr>
+              <a:t>DataStream&lt;Long&gt; lengths = strings</a:t>
+            </a:r>
+            <a:br>
+              <a:rPr lang="en" sz="1200" b="0" i="0" u="none" strike="noStrike" cap="none">
+                <a:solidFill>
+                  <a:schemeClr val="dk1"/>
+                </a:solidFill>
+                <a:latin typeface="Consolas"/>
+                <a:ea typeface="Consolas"/>
+                <a:cs typeface="Consolas"/>
+                <a:sym typeface="Consolas"/>
+              </a:rPr>
+            </a:br>
+            <a:r>
+              <a:rPr lang="en" sz="1200" b="0" i="0" u="none" strike="noStrike" cap="none">
+                <a:solidFill>
+                  <a:schemeClr val="dk1"/>
+                </a:solidFill>
+                <a:latin typeface="Consolas"/>
+                <a:ea typeface="Consolas"/>
+                <a:cs typeface="Consolas"/>
+                <a:sym typeface="Consolas"/>
+              </a:rPr>
+              <a:t>  .keyBy(0)</a:t>
+            </a:r>
+            <a:br>
+              <a:rPr lang="en" sz="1200" b="0" i="0" u="none" strike="noStrike" cap="none">
+                <a:solidFill>
+                  <a:schemeClr val="dk1"/>
+                </a:solidFill>
+                <a:latin typeface="Consolas"/>
+                <a:ea typeface="Consolas"/>
+                <a:cs typeface="Consolas"/>
+                <a:sym typeface="Consolas"/>
+              </a:rPr>
+            </a:br>
+            <a:r>
+              <a:rPr lang="en" sz="1200" b="0" i="0" u="none" strike="noStrike" cap="none">
+                <a:solidFill>
+                  <a:schemeClr val="dk1"/>
+                </a:solidFill>
+                <a:latin typeface="Consolas"/>
+                <a:ea typeface="Consolas"/>
+                <a:cs typeface="Consolas"/>
+                <a:sym typeface="Consolas"/>
+              </a:rPr>
+              <a:t>  .map(new MapWithCounter()); </a:t>
+            </a:r>
+          </a:p>
+          <a:p>
+            <a:pPr marL="0" marR="0" lvl="0" indent="0" algn="l" rtl="0">
+              <a:spcBef>
+                <a:spcPts val="240"/>
+              </a:spcBef>
+              <a:spcAft>
+                <a:spcPts val="0"/>
+              </a:spcAft>
+              <a:buClr>
+                <a:srgbClr val="34AD91"/>
+              </a:buClr>
+              <a:buSzPct val="25000"/>
+              <a:buFont typeface="Noto Sans Symbols"/>
+              <a:buNone/>
+            </a:pPr>
+            <a:endParaRPr sz="1200" b="1" i="0" u="none" strike="noStrike" cap="none">
+              <a:solidFill>
+                <a:srgbClr val="000080"/>
+              </a:solidFill>
+              <a:latin typeface="Consolas"/>
+              <a:ea typeface="Consolas"/>
+              <a:cs typeface="Consolas"/>
+              <a:sym typeface="Consolas"/>
+            </a:endParaRPr>
+          </a:p>
+          <a:p>
+            <a:pPr marL="0" marR="0" lvl="0" indent="0" algn="l" rtl="0">
+              <a:spcBef>
+                <a:spcPts val="240"/>
+              </a:spcBef>
+              <a:spcAft>
+                <a:spcPts val="0"/>
+              </a:spcAft>
+              <a:buClr>
+                <a:srgbClr val="34AD91"/>
+              </a:buClr>
+              <a:buSzPct val="25000"/>
+              <a:buFont typeface="Noto Sans Symbols"/>
+              <a:buNone/>
+            </a:pPr>
+            <a:r>
+              <a:rPr lang="en" sz="1200" b="1" i="0" u="none" strike="noStrike" cap="none">
+                <a:solidFill>
+                  <a:srgbClr val="000080"/>
+                </a:solidFill>
+                <a:latin typeface="Consolas"/>
+                <a:ea typeface="Consolas"/>
+                <a:cs typeface="Consolas"/>
+                <a:sym typeface="Consolas"/>
+              </a:rPr>
+              <a:t>public static class </a:t>
+            </a:r>
+            <a:r>
+              <a:rPr lang="en" sz="1200" b="0" i="0" u="none" strike="noStrike" cap="none">
+                <a:solidFill>
+                  <a:srgbClr val="000000"/>
+                </a:solidFill>
+                <a:latin typeface="Consolas"/>
+                <a:ea typeface="Consolas"/>
+                <a:cs typeface="Consolas"/>
+                <a:sym typeface="Consolas"/>
+              </a:rPr>
+              <a:t>MapWithCounter </a:t>
+            </a:r>
+            <a:r>
+              <a:rPr lang="en" sz="1200" b="1" i="0" u="none" strike="noStrike" cap="none">
+                <a:solidFill>
+                  <a:srgbClr val="000080"/>
+                </a:solidFill>
+                <a:latin typeface="Consolas"/>
+                <a:ea typeface="Consolas"/>
+                <a:cs typeface="Consolas"/>
+                <a:sym typeface="Consolas"/>
+              </a:rPr>
+              <a:t>extends </a:t>
+            </a:r>
+            <a:r>
+              <a:rPr lang="en" sz="1200" b="0" i="0" u="none" strike="noStrike" cap="none">
+                <a:solidFill>
+                  <a:srgbClr val="000000"/>
+                </a:solidFill>
+                <a:latin typeface="Consolas"/>
+                <a:ea typeface="Consolas"/>
+                <a:cs typeface="Consolas"/>
+                <a:sym typeface="Consolas"/>
+              </a:rPr>
+              <a:t>RichMapFunction&lt;Tuple2&lt;String, String&gt;, Long&gt; {</a:t>
+            </a:r>
+          </a:p>
+          <a:p>
+            <a:pPr marL="0" marR="0" lvl="0" indent="0" algn="l" rtl="0">
+              <a:spcBef>
+                <a:spcPts val="240"/>
+              </a:spcBef>
+              <a:spcAft>
+                <a:spcPts val="0"/>
+              </a:spcAft>
+              <a:buClr>
+                <a:srgbClr val="34AD91"/>
+              </a:buClr>
+              <a:buSzPct val="25000"/>
+              <a:buFont typeface="Noto Sans Symbols"/>
+              <a:buNone/>
+            </a:pPr>
+            <a:r>
+              <a:rPr lang="en" sz="1200" b="0" i="0" u="none" strike="noStrike" cap="none">
+                <a:solidFill>
+                  <a:srgbClr val="7F7F7F"/>
+                </a:solidFill>
+                <a:latin typeface="Consolas"/>
+                <a:ea typeface="Consolas"/>
+                <a:cs typeface="Consolas"/>
+                <a:sym typeface="Consolas"/>
+              </a:rPr>
+              <a:t>    // state object</a:t>
+            </a:r>
+          </a:p>
+          <a:p>
+            <a:pPr marL="0" marR="0" lvl="0" indent="0" algn="l" rtl="0">
+              <a:spcBef>
+                <a:spcPts val="240"/>
+              </a:spcBef>
+              <a:spcAft>
+                <a:spcPts val="0"/>
+              </a:spcAft>
+              <a:buClr>
+                <a:srgbClr val="34AD91"/>
+              </a:buClr>
+              <a:buSzPct val="25000"/>
+              <a:buFont typeface="Noto Sans Symbols"/>
+              <a:buNone/>
+            </a:pPr>
+            <a:r>
+              <a:rPr lang="en" sz="1200" b="1" i="0" u="none" strike="noStrike" cap="none">
+                <a:solidFill>
+                  <a:srgbClr val="000000"/>
+                </a:solidFill>
+                <a:latin typeface="Consolas"/>
+                <a:ea typeface="Consolas"/>
+                <a:cs typeface="Consolas"/>
+                <a:sym typeface="Consolas"/>
+              </a:rPr>
+              <a:t> </a:t>
+            </a:r>
+            <a:r>
+              <a:rPr lang="en" sz="1200" b="1" i="0" u="none" strike="noStrike" cap="none">
+                <a:solidFill>
+                  <a:srgbClr val="000080"/>
+                </a:solidFill>
+                <a:latin typeface="Consolas"/>
+                <a:ea typeface="Consolas"/>
+                <a:cs typeface="Consolas"/>
+                <a:sym typeface="Consolas"/>
+              </a:rPr>
+              <a:t>   private </a:t>
+            </a:r>
+            <a:r>
+              <a:rPr lang="en" sz="1200" b="0" i="0" u="none" strike="noStrike" cap="none">
+                <a:solidFill>
+                  <a:srgbClr val="FF0000"/>
+                </a:solidFill>
+                <a:latin typeface="Consolas"/>
+                <a:ea typeface="Consolas"/>
+                <a:cs typeface="Consolas"/>
+                <a:sym typeface="Consolas"/>
+              </a:rPr>
+              <a:t>ValueState&lt;Long&gt; totalLengthByKey</a:t>
+            </a:r>
+            <a:r>
+              <a:rPr lang="en" sz="1200" b="0" i="0" u="none" strike="noStrike" cap="none">
+                <a:solidFill>
+                  <a:srgbClr val="000000"/>
+                </a:solidFill>
+                <a:latin typeface="Consolas"/>
+                <a:ea typeface="Consolas"/>
+                <a:cs typeface="Consolas"/>
+                <a:sym typeface="Consolas"/>
+              </a:rPr>
+              <a:t>;</a:t>
+            </a:r>
+          </a:p>
+          <a:p>
+            <a:pPr marL="0" marR="0" lvl="0" indent="0" algn="l" rtl="0">
+              <a:spcBef>
+                <a:spcPts val="240"/>
+              </a:spcBef>
+              <a:spcAft>
+                <a:spcPts val="0"/>
+              </a:spcAft>
+              <a:buClr>
+                <a:srgbClr val="34AD91"/>
+              </a:buClr>
+              <a:buSzPct val="25000"/>
+              <a:buFont typeface="Noto Sans Symbols"/>
+              <a:buNone/>
+            </a:pPr>
+            <a:r>
+              <a:rPr lang="en" sz="1200" b="0" i="0" u="none" strike="noStrike" cap="none">
+                <a:solidFill>
+                  <a:srgbClr val="000000"/>
+                </a:solidFill>
+                <a:latin typeface="Consolas"/>
+                <a:ea typeface="Consolas"/>
+                <a:cs typeface="Consolas"/>
+                <a:sym typeface="Consolas"/>
+              </a:rPr>
+              <a:t>    </a:t>
+            </a:r>
+          </a:p>
+          <a:p>
+            <a:pPr marL="0" marR="0" lvl="0" indent="0" algn="l" rtl="0">
+              <a:spcBef>
+                <a:spcPts val="240"/>
+              </a:spcBef>
+              <a:spcAft>
+                <a:spcPts val="0"/>
+              </a:spcAft>
+              <a:buClr>
+                <a:srgbClr val="34AD91"/>
+              </a:buClr>
+              <a:buSzPct val="25000"/>
+              <a:buFont typeface="Noto Sans Symbols"/>
+              <a:buNone/>
+            </a:pPr>
+            <a:r>
+              <a:rPr lang="en" sz="1200" b="0" i="0" u="none" strike="noStrike" cap="none">
+                <a:solidFill>
+                  <a:srgbClr val="000000"/>
+                </a:solidFill>
+                <a:latin typeface="Consolas"/>
+                <a:ea typeface="Consolas"/>
+                <a:cs typeface="Consolas"/>
+                <a:sym typeface="Consolas"/>
+              </a:rPr>
+              <a:t>    </a:t>
+            </a:r>
+            <a:r>
+              <a:rPr lang="en" sz="1200" b="0" i="0" u="none" strike="noStrike" cap="none">
+                <a:solidFill>
+                  <a:srgbClr val="808000"/>
+                </a:solidFill>
+                <a:latin typeface="Consolas"/>
+                <a:ea typeface="Consolas"/>
+                <a:cs typeface="Consolas"/>
+                <a:sym typeface="Consolas"/>
+              </a:rPr>
+              <a:t>@Override</a:t>
+            </a:r>
+            <a:br>
+              <a:rPr lang="en" sz="1200" b="0" i="0" u="none" strike="noStrike" cap="none">
+                <a:solidFill>
+                  <a:srgbClr val="808000"/>
+                </a:solidFill>
+                <a:latin typeface="Consolas"/>
+                <a:ea typeface="Consolas"/>
+                <a:cs typeface="Consolas"/>
+                <a:sym typeface="Consolas"/>
+              </a:rPr>
+            </a:br>
+            <a:r>
+              <a:rPr lang="en" sz="1200" b="0" i="0" u="none" strike="noStrike" cap="none">
+                <a:solidFill>
+                  <a:srgbClr val="808000"/>
+                </a:solidFill>
+                <a:latin typeface="Consolas"/>
+                <a:ea typeface="Consolas"/>
+                <a:cs typeface="Consolas"/>
+                <a:sym typeface="Consolas"/>
+              </a:rPr>
+              <a:t>    </a:t>
+            </a:r>
+            <a:r>
+              <a:rPr lang="en" sz="1200" b="1" i="0" u="none" strike="noStrike" cap="none">
+                <a:solidFill>
+                  <a:srgbClr val="000080"/>
+                </a:solidFill>
+                <a:latin typeface="Consolas"/>
+                <a:ea typeface="Consolas"/>
+                <a:cs typeface="Consolas"/>
+                <a:sym typeface="Consolas"/>
+              </a:rPr>
+              <a:t>public void </a:t>
+            </a:r>
+            <a:r>
+              <a:rPr lang="en" sz="1200" b="0" i="0" u="none" strike="noStrike" cap="none">
+                <a:solidFill>
+                  <a:srgbClr val="000000"/>
+                </a:solidFill>
+                <a:latin typeface="Consolas"/>
+                <a:ea typeface="Consolas"/>
+                <a:cs typeface="Consolas"/>
+                <a:sym typeface="Consolas"/>
+              </a:rPr>
+              <a:t>open</a:t>
+            </a:r>
+            <a:r>
+              <a:rPr lang="en" sz="1200" b="1" i="0" u="none" strike="noStrike" cap="none">
+                <a:solidFill>
+                  <a:srgbClr val="000080"/>
+                </a:solidFill>
+                <a:latin typeface="Consolas"/>
+                <a:ea typeface="Consolas"/>
+                <a:cs typeface="Consolas"/>
+                <a:sym typeface="Consolas"/>
+              </a:rPr>
+              <a:t> </a:t>
+            </a:r>
+            <a:r>
+              <a:rPr lang="en" sz="1200" b="0" i="0" u="none" strike="noStrike" cap="none">
+                <a:solidFill>
+                  <a:srgbClr val="000000"/>
+                </a:solidFill>
+                <a:latin typeface="Consolas"/>
+                <a:ea typeface="Consolas"/>
+                <a:cs typeface="Consolas"/>
+                <a:sym typeface="Consolas"/>
+              </a:rPr>
+              <a:t>(Configuration conf) {</a:t>
+            </a:r>
+            <a:br>
+              <a:rPr lang="en" sz="1200" b="0" i="0" u="none" strike="noStrike" cap="none">
+                <a:solidFill>
+                  <a:srgbClr val="000000"/>
+                </a:solidFill>
+                <a:latin typeface="Consolas"/>
+                <a:ea typeface="Consolas"/>
+                <a:cs typeface="Consolas"/>
+                <a:sym typeface="Consolas"/>
+              </a:rPr>
+            </a:br>
+            <a:r>
+              <a:rPr lang="en" sz="1200" b="0" i="0" u="none" strike="noStrike" cap="none">
+                <a:solidFill>
+                  <a:srgbClr val="7F7F7F"/>
+                </a:solidFill>
+                <a:latin typeface="Consolas"/>
+                <a:ea typeface="Consolas"/>
+                <a:cs typeface="Consolas"/>
+                <a:sym typeface="Consolas"/>
+              </a:rPr>
+              <a:t>        // obtain state object</a:t>
+            </a:r>
+          </a:p>
+          <a:p>
+            <a:pPr marL="0" marR="0" lvl="0" indent="0" algn="l" rtl="0">
+              <a:spcBef>
+                <a:spcPts val="240"/>
+              </a:spcBef>
+              <a:spcAft>
+                <a:spcPts val="0"/>
+              </a:spcAft>
+              <a:buClr>
+                <a:srgbClr val="34AD91"/>
+              </a:buClr>
+              <a:buSzPct val="25000"/>
+              <a:buFont typeface="Noto Sans Symbols"/>
+              <a:buNone/>
+            </a:pPr>
+            <a:r>
+              <a:rPr lang="en" sz="1200" b="0" i="0" u="none" strike="noStrike" cap="none">
+                <a:solidFill>
+                  <a:srgbClr val="000000"/>
+                </a:solidFill>
+                <a:latin typeface="Consolas"/>
+                <a:ea typeface="Consolas"/>
+                <a:cs typeface="Consolas"/>
+                <a:sym typeface="Consolas"/>
+              </a:rPr>
+              <a:t>        </a:t>
+            </a:r>
+            <a:r>
+              <a:rPr lang="en" sz="1200" b="0" i="0" u="none" strike="noStrike" cap="none">
+                <a:solidFill>
+                  <a:srgbClr val="FF0000"/>
+                </a:solidFill>
+                <a:latin typeface="Consolas"/>
+                <a:ea typeface="Consolas"/>
+                <a:cs typeface="Consolas"/>
+                <a:sym typeface="Consolas"/>
+              </a:rPr>
+              <a:t>ValueStateDescriptor&lt;Long&gt; descriptor = new ValueStateDescriptor&lt;&gt;(</a:t>
+            </a:r>
+          </a:p>
+          <a:p>
+            <a:pPr marL="0" marR="0" lvl="0" indent="0" algn="l" rtl="0">
+              <a:spcBef>
+                <a:spcPts val="240"/>
+              </a:spcBef>
+              <a:spcAft>
+                <a:spcPts val="0"/>
+              </a:spcAft>
+              <a:buClr>
+                <a:srgbClr val="34AD91"/>
+              </a:buClr>
+              <a:buSzPct val="25000"/>
+              <a:buFont typeface="Noto Sans Symbols"/>
+              <a:buNone/>
+            </a:pPr>
+            <a:r>
+              <a:rPr lang="en" sz="1200" b="0" i="0" u="none" strike="noStrike" cap="none">
+                <a:solidFill>
+                  <a:srgbClr val="FF0000"/>
+                </a:solidFill>
+                <a:latin typeface="Consolas"/>
+                <a:ea typeface="Consolas"/>
+                <a:cs typeface="Consolas"/>
+                <a:sym typeface="Consolas"/>
+              </a:rPr>
+              <a:t>            "totalLengthByKey", Long.class, 0L);</a:t>
+            </a:r>
+          </a:p>
+          <a:p>
+            <a:pPr marL="0" marR="0" lvl="0" indent="0" algn="l" rtl="0">
+              <a:spcBef>
+                <a:spcPts val="240"/>
+              </a:spcBef>
+              <a:spcAft>
+                <a:spcPts val="0"/>
+              </a:spcAft>
+              <a:buClr>
+                <a:srgbClr val="34AD91"/>
+              </a:buClr>
+              <a:buSzPct val="25000"/>
+              <a:buFont typeface="Noto Sans Symbols"/>
+              <a:buNone/>
+            </a:pPr>
+            <a:r>
+              <a:rPr lang="en" sz="1200" b="0" i="0" u="none" strike="noStrike" cap="none">
+                <a:solidFill>
+                  <a:srgbClr val="000000"/>
+                </a:solidFill>
+                <a:latin typeface="Consolas"/>
+                <a:ea typeface="Consolas"/>
+                <a:cs typeface="Consolas"/>
+                <a:sym typeface="Consolas"/>
+              </a:rPr>
+              <a:t>        totalLengthByKey = getRuntimeContext().</a:t>
+            </a:r>
+            <a:r>
+              <a:rPr lang="en" sz="1200" b="0" i="0" u="none" strike="noStrike" cap="none">
+                <a:solidFill>
+                  <a:srgbClr val="FF0000"/>
+                </a:solidFill>
+                <a:latin typeface="Consolas"/>
+                <a:ea typeface="Consolas"/>
+                <a:cs typeface="Consolas"/>
+                <a:sym typeface="Consolas"/>
+              </a:rPr>
+              <a:t>getState(descriptor)</a:t>
+            </a:r>
+            <a:r>
+              <a:rPr lang="en" sz="1200" b="0" i="0" u="none" strike="noStrike" cap="none">
+                <a:solidFill>
+                  <a:srgbClr val="000000"/>
+                </a:solidFill>
+                <a:latin typeface="Consolas"/>
+                <a:ea typeface="Consolas"/>
+                <a:cs typeface="Consolas"/>
+                <a:sym typeface="Consolas"/>
+              </a:rPr>
+              <a:t>;</a:t>
+            </a:r>
+          </a:p>
+          <a:p>
+            <a:pPr marL="0" marR="0" lvl="0" indent="0" algn="l" rtl="0">
+              <a:spcBef>
+                <a:spcPts val="240"/>
+              </a:spcBef>
+              <a:spcAft>
+                <a:spcPts val="0"/>
+              </a:spcAft>
+              <a:buClr>
+                <a:srgbClr val="34AD91"/>
+              </a:buClr>
+              <a:buSzPct val="25000"/>
+              <a:buFont typeface="Noto Sans Symbols"/>
+              <a:buNone/>
+            </a:pPr>
+            <a:r>
+              <a:rPr lang="en" sz="1200" b="0" i="0" u="none" strike="noStrike" cap="none">
+                <a:solidFill>
+                  <a:srgbClr val="000000"/>
+                </a:solidFill>
+                <a:latin typeface="Consolas"/>
+                <a:ea typeface="Consolas"/>
+                <a:cs typeface="Consolas"/>
+                <a:sym typeface="Consolas"/>
+              </a:rPr>
+              <a:t>    }</a:t>
+            </a:r>
+          </a:p>
+          <a:p>
+            <a:pPr marL="0" marR="0" lvl="0" indent="0" algn="l" rtl="0">
+              <a:spcBef>
+                <a:spcPts val="240"/>
+              </a:spcBef>
+              <a:spcAft>
+                <a:spcPts val="0"/>
+              </a:spcAft>
+              <a:buClr>
+                <a:srgbClr val="34AD91"/>
+              </a:buClr>
+              <a:buSzPct val="25000"/>
+              <a:buFont typeface="Noto Sans Symbols"/>
+              <a:buNone/>
+            </a:pPr>
+            <a:r>
+              <a:rPr lang="en" sz="1200" b="0" i="0" u="none" strike="noStrike" cap="none">
+                <a:solidFill>
+                  <a:srgbClr val="000000"/>
+                </a:solidFill>
+                <a:latin typeface="Consolas"/>
+                <a:ea typeface="Consolas"/>
+                <a:cs typeface="Consolas"/>
+                <a:sym typeface="Consolas"/>
+              </a:rPr>
+              <a:t/>
+            </a:r>
+            <a:br>
+              <a:rPr lang="en" sz="1200" b="0" i="0" u="none" strike="noStrike" cap="none">
+                <a:solidFill>
+                  <a:srgbClr val="000000"/>
+                </a:solidFill>
+                <a:latin typeface="Consolas"/>
+                <a:ea typeface="Consolas"/>
+                <a:cs typeface="Consolas"/>
+                <a:sym typeface="Consolas"/>
+              </a:rPr>
+            </a:br>
+            <a:r>
+              <a:rPr lang="en" sz="1200" b="0" i="0" u="none" strike="noStrike" cap="none">
+                <a:solidFill>
+                  <a:srgbClr val="000000"/>
+                </a:solidFill>
+                <a:latin typeface="Consolas"/>
+                <a:ea typeface="Consolas"/>
+                <a:cs typeface="Consolas"/>
+                <a:sym typeface="Consolas"/>
+              </a:rPr>
+              <a:t>    </a:t>
+            </a:r>
+            <a:r>
+              <a:rPr lang="en" sz="1200" b="0" i="0" u="none" strike="noStrike" cap="none">
+                <a:solidFill>
+                  <a:srgbClr val="808000"/>
+                </a:solidFill>
+                <a:latin typeface="Consolas"/>
+                <a:ea typeface="Consolas"/>
+                <a:cs typeface="Consolas"/>
+                <a:sym typeface="Consolas"/>
+              </a:rPr>
+              <a:t>@Override</a:t>
+            </a:r>
+            <a:br>
+              <a:rPr lang="en" sz="1200" b="0" i="0" u="none" strike="noStrike" cap="none">
+                <a:solidFill>
+                  <a:srgbClr val="808000"/>
+                </a:solidFill>
+                <a:latin typeface="Consolas"/>
+                <a:ea typeface="Consolas"/>
+                <a:cs typeface="Consolas"/>
+                <a:sym typeface="Consolas"/>
+              </a:rPr>
+            </a:br>
+            <a:r>
+              <a:rPr lang="en" sz="1200" b="0" i="0" u="none" strike="noStrike" cap="none">
+                <a:solidFill>
+                  <a:srgbClr val="808000"/>
+                </a:solidFill>
+                <a:latin typeface="Consolas"/>
+                <a:ea typeface="Consolas"/>
+                <a:cs typeface="Consolas"/>
+                <a:sym typeface="Consolas"/>
+              </a:rPr>
+              <a:t>    </a:t>
+            </a:r>
+            <a:r>
+              <a:rPr lang="en" sz="1200" b="1" i="0" u="none" strike="noStrike" cap="none">
+                <a:solidFill>
+                  <a:srgbClr val="000080"/>
+                </a:solidFill>
+                <a:latin typeface="Consolas"/>
+                <a:ea typeface="Consolas"/>
+                <a:cs typeface="Consolas"/>
+                <a:sym typeface="Consolas"/>
+              </a:rPr>
+              <a:t>public </a:t>
+            </a:r>
+            <a:r>
+              <a:rPr lang="en" sz="1200" b="0" i="0" u="none" strike="noStrike" cap="none">
+                <a:solidFill>
+                  <a:srgbClr val="000000"/>
+                </a:solidFill>
+                <a:latin typeface="Consolas"/>
+                <a:ea typeface="Consolas"/>
+                <a:cs typeface="Consolas"/>
+                <a:sym typeface="Consolas"/>
+              </a:rPr>
+              <a:t>Long</a:t>
+            </a:r>
+            <a:r>
+              <a:rPr lang="en" sz="1200" b="1" i="0" u="none" strike="noStrike" cap="none">
+                <a:solidFill>
+                  <a:srgbClr val="000080"/>
+                </a:solidFill>
+                <a:latin typeface="Consolas"/>
+                <a:ea typeface="Consolas"/>
+                <a:cs typeface="Consolas"/>
+                <a:sym typeface="Consolas"/>
+              </a:rPr>
+              <a:t> </a:t>
+            </a:r>
+            <a:r>
+              <a:rPr lang="en" sz="1200" b="0" i="0" u="none" strike="noStrike" cap="none">
+                <a:solidFill>
+                  <a:srgbClr val="000000"/>
+                </a:solidFill>
+                <a:latin typeface="Consolas"/>
+                <a:ea typeface="Consolas"/>
+                <a:cs typeface="Consolas"/>
+                <a:sym typeface="Consolas"/>
+              </a:rPr>
+              <a:t>map</a:t>
+            </a:r>
+            <a:r>
+              <a:rPr lang="en" sz="1200" b="1" i="0" u="none" strike="noStrike" cap="none">
+                <a:solidFill>
+                  <a:srgbClr val="000080"/>
+                </a:solidFill>
+                <a:latin typeface="Consolas"/>
+                <a:ea typeface="Consolas"/>
+                <a:cs typeface="Consolas"/>
+                <a:sym typeface="Consolas"/>
+              </a:rPr>
+              <a:t> </a:t>
+            </a:r>
+            <a:r>
+              <a:rPr lang="en" sz="1200" b="0" i="0" u="none" strike="noStrike" cap="none">
+                <a:solidFill>
+                  <a:srgbClr val="000000"/>
+                </a:solidFill>
+                <a:latin typeface="Consolas"/>
+                <a:ea typeface="Consolas"/>
+                <a:cs typeface="Consolas"/>
+                <a:sym typeface="Consolas"/>
+              </a:rPr>
+              <a:t>(Tuple2&lt;String, String&gt; value) </a:t>
+            </a:r>
+            <a:r>
+              <a:rPr lang="en" sz="1200" b="1" i="0" u="none" strike="noStrike" cap="none">
+                <a:solidFill>
+                  <a:srgbClr val="000080"/>
+                </a:solidFill>
+                <a:latin typeface="Consolas"/>
+                <a:ea typeface="Consolas"/>
+                <a:cs typeface="Consolas"/>
+                <a:sym typeface="Consolas"/>
+              </a:rPr>
+              <a:t>throws</a:t>
+            </a:r>
+            <a:r>
+              <a:rPr lang="en" sz="1200" b="0" i="0" u="none" strike="noStrike" cap="none">
+                <a:solidFill>
+                  <a:srgbClr val="000000"/>
+                </a:solidFill>
+                <a:latin typeface="Consolas"/>
+                <a:ea typeface="Consolas"/>
+                <a:cs typeface="Consolas"/>
+                <a:sym typeface="Consolas"/>
+              </a:rPr>
+              <a:t> Exception {</a:t>
+            </a:r>
+          </a:p>
+          <a:p>
+            <a:pPr marL="0" marR="0" lvl="0" indent="0" algn="l" rtl="0">
+              <a:spcBef>
+                <a:spcPts val="240"/>
+              </a:spcBef>
+              <a:spcAft>
+                <a:spcPts val="0"/>
+              </a:spcAft>
+              <a:buClr>
+                <a:srgbClr val="34AD91"/>
+              </a:buClr>
+              <a:buSzPct val="25000"/>
+              <a:buFont typeface="Noto Sans Symbols"/>
+              <a:buNone/>
+            </a:pPr>
+            <a:r>
+              <a:rPr lang="en" sz="1200" b="0" i="0" u="none" strike="noStrike" cap="none">
+                <a:solidFill>
+                  <a:srgbClr val="000000"/>
+                </a:solidFill>
+                <a:latin typeface="Consolas"/>
+                <a:ea typeface="Consolas"/>
+                <a:cs typeface="Consolas"/>
+                <a:sym typeface="Consolas"/>
+              </a:rPr>
+              <a:t>        long length = </a:t>
+            </a:r>
+            <a:r>
+              <a:rPr lang="en" sz="1200" b="0" i="0" u="none" strike="noStrike" cap="none">
+                <a:solidFill>
+                  <a:srgbClr val="FF0000"/>
+                </a:solidFill>
+                <a:latin typeface="Consolas"/>
+                <a:ea typeface="Consolas"/>
+                <a:cs typeface="Consolas"/>
+                <a:sym typeface="Consolas"/>
+              </a:rPr>
+              <a:t>totalLengthByKey.value()</a:t>
+            </a:r>
+            <a:r>
+              <a:rPr lang="en" sz="1200" b="0" i="0" u="none" strike="noStrike" cap="none">
+                <a:solidFill>
+                  <a:srgbClr val="000000"/>
+                </a:solidFill>
+                <a:latin typeface="Consolas"/>
+                <a:ea typeface="Consolas"/>
+                <a:cs typeface="Consolas"/>
+                <a:sym typeface="Consolas"/>
+              </a:rPr>
+              <a:t>;    </a:t>
+            </a:r>
+            <a:r>
+              <a:rPr lang="en" sz="1200" b="0" i="0" u="none" strike="noStrike" cap="none">
+                <a:solidFill>
+                  <a:srgbClr val="7F7F7F"/>
+                </a:solidFill>
+                <a:latin typeface="Consolas"/>
+                <a:ea typeface="Consolas"/>
+                <a:cs typeface="Consolas"/>
+                <a:sym typeface="Consolas"/>
+              </a:rPr>
+              <a:t>// fetch state for current key</a:t>
+            </a:r>
+          </a:p>
+          <a:p>
+            <a:pPr marL="0" marR="0" lvl="0" indent="0" algn="l" rtl="0">
+              <a:spcBef>
+                <a:spcPts val="240"/>
+              </a:spcBef>
+              <a:spcAft>
+                <a:spcPts val="0"/>
+              </a:spcAft>
+              <a:buClr>
+                <a:srgbClr val="34AD91"/>
+              </a:buClr>
+              <a:buSzPct val="25000"/>
+              <a:buFont typeface="Noto Sans Symbols"/>
+              <a:buNone/>
+            </a:pPr>
+            <a:r>
+              <a:rPr lang="en" sz="1200" b="0" i="0" u="none" strike="noStrike" cap="none">
+                <a:solidFill>
+                  <a:srgbClr val="000000"/>
+                </a:solidFill>
+                <a:latin typeface="Consolas"/>
+                <a:ea typeface="Consolas"/>
+                <a:cs typeface="Consolas"/>
+                <a:sym typeface="Consolas"/>
+              </a:rPr>
+              <a:t>        long newTotalLength = length + value.f1.length();</a:t>
+            </a:r>
+          </a:p>
+          <a:p>
+            <a:pPr marL="0" marR="0" lvl="0" indent="0" algn="l" rtl="0">
+              <a:spcBef>
+                <a:spcPts val="240"/>
+              </a:spcBef>
+              <a:spcAft>
+                <a:spcPts val="0"/>
+              </a:spcAft>
+              <a:buClr>
+                <a:srgbClr val="34AD91"/>
+              </a:buClr>
+              <a:buSzPct val="25000"/>
+              <a:buFont typeface="Noto Sans Symbols"/>
+              <a:buNone/>
+            </a:pPr>
+            <a:r>
+              <a:rPr lang="en" sz="1200" b="0" i="0" u="none" strike="noStrike" cap="none">
+                <a:solidFill>
+                  <a:srgbClr val="FF0000"/>
+                </a:solidFill>
+                <a:latin typeface="Consolas"/>
+                <a:ea typeface="Consolas"/>
+                <a:cs typeface="Consolas"/>
+                <a:sym typeface="Consolas"/>
+              </a:rPr>
+              <a:t>        totalLengthByKey.update(newTotalLength);   </a:t>
+            </a:r>
+            <a:r>
+              <a:rPr lang="en" sz="1200" b="0" i="0" u="none" strike="noStrike" cap="none">
+                <a:solidFill>
+                  <a:srgbClr val="7F7F7F"/>
+                </a:solidFill>
+                <a:latin typeface="Consolas"/>
+                <a:ea typeface="Consolas"/>
+                <a:cs typeface="Consolas"/>
+                <a:sym typeface="Consolas"/>
+              </a:rPr>
+              <a:t>// update state of current key</a:t>
+            </a:r>
+          </a:p>
+          <a:p>
+            <a:pPr marL="0" marR="0" lvl="0" indent="0" algn="l" rtl="0">
+              <a:spcBef>
+                <a:spcPts val="240"/>
+              </a:spcBef>
+              <a:spcAft>
+                <a:spcPts val="0"/>
+              </a:spcAft>
+              <a:buClr>
+                <a:srgbClr val="34AD91"/>
+              </a:buClr>
+              <a:buSzPct val="25000"/>
+              <a:buFont typeface="Noto Sans Symbols"/>
+              <a:buNone/>
+            </a:pPr>
+            <a:r>
+              <a:rPr lang="en" sz="1200" b="0" i="0" u="none" strike="noStrike" cap="none">
+                <a:solidFill>
+                  <a:srgbClr val="000000"/>
+                </a:solidFill>
+                <a:latin typeface="Consolas"/>
+                <a:ea typeface="Consolas"/>
+                <a:cs typeface="Consolas"/>
+                <a:sym typeface="Consolas"/>
+              </a:rPr>
+              <a:t>        </a:t>
+            </a:r>
+            <a:r>
+              <a:rPr lang="en" sz="1200" b="1" i="0" u="none" strike="noStrike" cap="none">
+                <a:solidFill>
+                  <a:srgbClr val="000080"/>
+                </a:solidFill>
+                <a:latin typeface="Consolas"/>
+                <a:ea typeface="Consolas"/>
+                <a:cs typeface="Consolas"/>
+                <a:sym typeface="Consolas"/>
+              </a:rPr>
+              <a:t>return</a:t>
+            </a:r>
+            <a:r>
+              <a:rPr lang="en" sz="1200" b="0" i="0" u="none" strike="noStrike" cap="none">
+                <a:solidFill>
+                  <a:srgbClr val="000000"/>
+                </a:solidFill>
+                <a:latin typeface="Consolas"/>
+                <a:ea typeface="Consolas"/>
+                <a:cs typeface="Consolas"/>
+                <a:sym typeface="Consolas"/>
+              </a:rPr>
+              <a:t> totalLengthByKey.value();</a:t>
+            </a:r>
+          </a:p>
+          <a:p>
+            <a:pPr marL="0" marR="0" lvl="0" indent="0" algn="l" rtl="0">
+              <a:spcBef>
+                <a:spcPts val="240"/>
+              </a:spcBef>
+              <a:spcAft>
+                <a:spcPts val="0"/>
+              </a:spcAft>
+              <a:buClr>
+                <a:srgbClr val="34AD91"/>
+              </a:buClr>
+              <a:buSzPct val="25000"/>
+              <a:buFont typeface="Noto Sans Symbols"/>
+              <a:buNone/>
+            </a:pPr>
+            <a:r>
+              <a:rPr lang="en" sz="1200" b="0" i="0" u="none" strike="noStrike" cap="none">
+                <a:solidFill>
+                  <a:srgbClr val="000000"/>
+                </a:solidFill>
+                <a:latin typeface="Consolas"/>
+                <a:ea typeface="Consolas"/>
+                <a:cs typeface="Consolas"/>
+                <a:sym typeface="Consolas"/>
+              </a:rPr>
+              <a:t>    } </a:t>
+            </a:r>
+          </a:p>
+          <a:p>
+            <a:pPr marL="0" marR="0" lvl="0" indent="0" algn="l" rtl="0">
+              <a:spcBef>
+                <a:spcPts val="240"/>
+              </a:spcBef>
+              <a:buClr>
+                <a:srgbClr val="34AD91"/>
+              </a:buClr>
+              <a:buSzPct val="25000"/>
+              <a:buFont typeface="Noto Sans Symbols"/>
+              <a:buNone/>
+            </a:pPr>
+            <a:r>
+              <a:rPr lang="en" sz="1200" b="0" i="0" u="none" strike="noStrike" cap="none">
+                <a:solidFill>
+                  <a:srgbClr val="000000"/>
+                </a:solidFill>
+                <a:latin typeface="Consolas"/>
+                <a:ea typeface="Consolas"/>
+                <a:cs typeface="Consolas"/>
+                <a:sym typeface="Consolas"/>
+              </a:rPr>
+              <a:t>}</a:t>
+            </a:r>
+          </a:p>
+        </p:txBody>
+      </p:sp>
+    </p:spTree>
+  </p:cSld>
+  <p:clrMapOvr>
+    <a:masterClrMapping/>
+  </p:clrMapOvr>
+</p:sld>
+</file>
+
+<file path=ppt/slides/slide21.xml><?xml version="1.0" encoding="utf-8"?>
+<p:sld xmlns:a="http://schemas.openxmlformats.org/drawingml/2006/main" xmlns:r="http://schemas.openxmlformats.org/officeDocument/2006/relationships" xmlns:p="http://schemas.openxmlformats.org/presentationml/2006/main">
+  <p:cSld>
+    <p:spTree>
+      <p:nvGrpSpPr>
+        <p:cNvPr id="1" name="Shape 241"/>
+        <p:cNvGrpSpPr/>
+        <p:nvPr/>
+      </p:nvGrpSpPr>
+      <p:grpSpPr>
+        <a:xfrm>
+          <a:off x="0" y="0"/>
+          <a:ext cx="0" cy="0"/>
+          <a:chOff x="0" y="0"/>
+          <a:chExt cx="0" cy="0"/>
+        </a:xfrm>
+      </p:grpSpPr>
+      <p:sp>
+        <p:nvSpPr>
+          <p:cNvPr id="242" name="Shape 242"/>
+          <p:cNvSpPr txBox="1">
+            <a:spLocks noGrp="1"/>
+          </p:cNvSpPr>
+          <p:nvPr>
+            <p:ph type="title"/>
+          </p:nvPr>
+        </p:nvSpPr>
+        <p:spPr>
+          <a:xfrm>
+            <a:off x="722312" y="4406900"/>
+            <a:ext cx="7772400" cy="1362075"/>
+          </a:xfrm>
+          <a:prstGeom prst="rect">
+            <a:avLst/>
+          </a:prstGeom>
+          <a:noFill/>
+          <a:ln>
+            <a:noFill/>
+          </a:ln>
+        </p:spPr>
+        <p:txBody>
+          <a:bodyPr lIns="91425" tIns="45700" rIns="91425" bIns="45700" anchor="t" anchorCtr="0">
+            <a:noAutofit/>
+          </a:bodyPr>
+          <a:lstStyle/>
+          <a:p>
+            <a:pPr marL="0" marR="0" lvl="0" indent="0" algn="l" rtl="0">
+              <a:spcBef>
+                <a:spcPts val="0"/>
+              </a:spcBef>
+              <a:buClr>
+                <a:srgbClr val="FFFFFF"/>
+              </a:buClr>
+              <a:buSzPct val="25000"/>
+              <a:buFont typeface="Calibri"/>
+              <a:buNone/>
+            </a:pPr>
+            <a:r>
+              <a:rPr lang="en" sz="4000" b="1" i="0" u="none" strike="noStrike" cap="none">
+                <a:solidFill>
+                  <a:srgbClr val="FFFFFF"/>
+                </a:solidFill>
+                <a:latin typeface="Calibri"/>
+                <a:ea typeface="Calibri"/>
+                <a:cs typeface="Calibri"/>
+                <a:sym typeface="Calibri"/>
+              </a:rPr>
+              <a:t>State Backends</a:t>
+            </a:r>
+          </a:p>
+        </p:txBody>
+      </p:sp>
+      <p:sp>
+        <p:nvSpPr>
+          <p:cNvPr id="243" name="Shape 243"/>
+          <p:cNvSpPr txBox="1">
+            <a:spLocks noGrp="1"/>
+          </p:cNvSpPr>
+          <p:nvPr>
+            <p:ph type="body" idx="1"/>
+          </p:nvPr>
+        </p:nvSpPr>
+        <p:spPr>
+          <a:xfrm>
+            <a:off x="722312" y="2906713"/>
+            <a:ext cx="7772400" cy="1500187"/>
+          </a:xfrm>
+          <a:prstGeom prst="rect">
+            <a:avLst/>
+          </a:prstGeom>
+          <a:noFill/>
+          <a:ln>
+            <a:noFill/>
+          </a:ln>
+        </p:spPr>
+        <p:txBody>
+          <a:bodyPr lIns="91425" tIns="45700" rIns="91425" bIns="45700" anchor="b" anchorCtr="0">
+            <a:noAutofit/>
+          </a:bodyPr>
+          <a:lstStyle/>
+          <a:p>
+            <a:pPr marL="0" marR="0" lvl="0" indent="0" algn="l" rtl="0">
+              <a:spcBef>
+                <a:spcPts val="0"/>
+              </a:spcBef>
+              <a:buClr>
+                <a:srgbClr val="34AD91"/>
+              </a:buClr>
+              <a:buSzPct val="25000"/>
+              <a:buFont typeface="Noto Sans Symbols"/>
+              <a:buNone/>
+            </a:pPr>
+            <a:endParaRPr sz="2000" b="0" i="0" u="none" strike="noStrike" cap="none">
+              <a:solidFill>
+                <a:srgbClr val="FFFFFF"/>
+              </a:solidFill>
+              <a:latin typeface="Calibri"/>
+              <a:ea typeface="Calibri"/>
+              <a:cs typeface="Calibri"/>
+              <a:sym typeface="Calibri"/>
+            </a:endParaRPr>
+          </a:p>
+        </p:txBody>
+      </p:sp>
+      <p:sp>
+        <p:nvSpPr>
+          <p:cNvPr id="244" name="Shape 244"/>
+          <p:cNvSpPr txBox="1">
+            <a:spLocks noGrp="1"/>
+          </p:cNvSpPr>
+          <p:nvPr>
+            <p:ph type="sldNum" idx="12"/>
+          </p:nvPr>
+        </p:nvSpPr>
+        <p:spPr>
+          <a:xfrm>
+            <a:off x="6553200" y="6356350"/>
+            <a:ext cx="2133599" cy="365125"/>
+          </a:xfrm>
+          <a:prstGeom prst="rect">
+            <a:avLst/>
+          </a:prstGeom>
+          <a:noFill/>
+          <a:ln>
+            <a:noFill/>
+          </a:ln>
+        </p:spPr>
+        <p:txBody>
+          <a:bodyPr lIns="91425" tIns="45700" rIns="91425" bIns="45700" anchor="ctr" anchorCtr="0">
+            <a:noAutofit/>
+          </a:bodyPr>
+          <a:lstStyle/>
+          <a:p>
+            <a:pPr marL="0" marR="0" lvl="0" indent="0" algn="r" rtl="0">
+              <a:spcBef>
+                <a:spcPts val="0"/>
+              </a:spcBef>
+              <a:buSzPct val="25000"/>
+              <a:buNone/>
+            </a:pPr>
+            <a:fld id="{00000000-1234-1234-1234-123412341234}" type="slidenum">
+              <a:rPr lang="en" sz="1200">
+                <a:solidFill>
+                  <a:srgbClr val="888888"/>
+                </a:solidFill>
+                <a:latin typeface="Calibri"/>
+                <a:ea typeface="Calibri"/>
+                <a:cs typeface="Calibri"/>
+                <a:sym typeface="Calibri"/>
+              </a:rPr>
+              <a:t>21</a:t>
+            </a:fld>
+            <a:endParaRPr lang="en" sz="1200">
+              <a:solidFill>
+                <a:srgbClr val="888888"/>
+              </a:solidFill>
+              <a:latin typeface="Calibri"/>
+              <a:ea typeface="Calibri"/>
+              <a:cs typeface="Calibri"/>
+              <a:sym typeface="Calibri"/>
+            </a:endParaRPr>
+          </a:p>
+        </p:txBody>
+      </p:sp>
+    </p:spTree>
+  </p:cSld>
+  <p:clrMapOvr>
+    <a:masterClrMapping/>
+  </p:clrMapOvr>
+</p:sld>
+</file>
+
+<file path=ppt/slides/slide22.xml><?xml version="1.0" encoding="utf-8"?>
+<p:sld xmlns:a="http://schemas.openxmlformats.org/drawingml/2006/main" xmlns:r="http://schemas.openxmlformats.org/officeDocument/2006/relationships" xmlns:p="http://schemas.openxmlformats.org/presentationml/2006/main">
+  <p:cSld>
+    <p:spTree>
+      <p:nvGrpSpPr>
         <p:cNvPr id="1" name="Shape 248"/>
         <p:cNvGrpSpPr/>
         <p:nvPr/>
@@ -24367,7 +24681,7 @@
                 <a:cs typeface="Calibri"/>
                 <a:sym typeface="Calibri"/>
               </a:rPr>
-              <a:t>20</a:t>
+              <a:t>22</a:t>
             </a:fld>
             <a:endParaRPr lang="en" sz="1200">
               <a:solidFill>
@@ -24389,7 +24703,7 @@
 </p:sld>
 </file>
 
-<file path=ppt/slides/slide21.xml><?xml version="1.0" encoding="utf-8"?>
+<file path=ppt/slides/slide23.xml><?xml version="1.0" encoding="utf-8"?>
 <p:sld xmlns:a="http://schemas.openxmlformats.org/drawingml/2006/main" xmlns:r="http://schemas.openxmlformats.org/officeDocument/2006/relationships" xmlns:p="http://schemas.openxmlformats.org/presentationml/2006/main">
   <p:cSld>
     <p:spTree>
@@ -24986,7 +25300,7 @@
                 <a:cs typeface="Calibri"/>
                 <a:sym typeface="Calibri"/>
               </a:rPr>
-              <a:t>21</a:t>
+              <a:t>23</a:t>
             </a:fld>
             <a:endParaRPr lang="en" sz="1200">
               <a:solidFill>
@@ -25008,7 +25322,7 @@
 </p:sld>
 </file>
 
-<file path=ppt/slides/slide22.xml><?xml version="1.0" encoding="utf-8"?>
+<file path=ppt/slides/slide24.xml><?xml version="1.0" encoding="utf-8"?>
 <p:sld xmlns:a="http://schemas.openxmlformats.org/drawingml/2006/main" xmlns:r="http://schemas.openxmlformats.org/officeDocument/2006/relationships" xmlns:p="http://schemas.openxmlformats.org/presentationml/2006/main">
   <p:cSld>
     <p:spTree>
@@ -25523,7 +25837,7 @@
                 <a:cs typeface="Calibri"/>
                 <a:sym typeface="Calibri"/>
               </a:rPr>
-              <a:t>22</a:t>
+              <a:t>24</a:t>
             </a:fld>
             <a:endParaRPr lang="en" sz="1200">
               <a:solidFill>
@@ -25545,7 +25859,7 @@
 </p:sld>
 </file>
 
-<file path=ppt/slides/slide23.xml><?xml version="1.0" encoding="utf-8"?>
+<file path=ppt/slides/slide25.xml><?xml version="1.0" encoding="utf-8"?>
 <p:sld xmlns:a="http://schemas.openxmlformats.org/drawingml/2006/main" xmlns:r="http://schemas.openxmlformats.org/officeDocument/2006/relationships" xmlns:p="http://schemas.openxmlformats.org/presentationml/2006/main">
   <p:cSld>
     <p:spTree>
@@ -25715,7 +26029,7 @@
                 <a:cs typeface="Calibri"/>
                 <a:sym typeface="Calibri"/>
               </a:rPr>
-              <a:t>23</a:t>
+              <a:t>25</a:t>
             </a:fld>
             <a:endParaRPr lang="en" sz="1200">
               <a:solidFill>
@@ -25737,7 +26051,7 @@
 </p:sld>
 </file>
 
-<file path=ppt/slides/slide24.xml><?xml version="1.0" encoding="utf-8"?>
+<file path=ppt/slides/slide26.xml><?xml version="1.0" encoding="utf-8"?>
 <p:sld xmlns:a="http://schemas.openxmlformats.org/drawingml/2006/main" xmlns:r="http://schemas.openxmlformats.org/officeDocument/2006/relationships" xmlns:p="http://schemas.openxmlformats.org/presentationml/2006/main">
   <p:cSld>
     <p:spTree>
@@ -25855,7 +26169,7 @@
                 <a:cs typeface="Calibri"/>
                 <a:sym typeface="Calibri"/>
               </a:rPr>
-              <a:t>24</a:t>
+              <a:t>26</a:t>
             </a:fld>
             <a:endParaRPr lang="en" sz="1200">
               <a:solidFill>
@@ -25898,6 +26212,59 @@
           </a:bodyPr>
           <a:lstStyle/>
           <a:p>
+            <a:pPr indent="-342900">
+              <a:lnSpc>
+                <a:spcPct val="90000"/>
+              </a:lnSpc>
+              <a:spcBef>
+                <a:spcPts val="0"/>
+              </a:spcBef>
+              <a:buSzPct val="99107"/>
+            </a:pPr>
+            <a:r>
+              <a:rPr lang="en-US" sz="2000" dirty="0"/>
+              <a:t>A "Checkpoint" is a globally consistent point-in-time snapshot of </a:t>
+            </a:r>
+            <a:r>
+              <a:rPr lang="en-US" sz="2000" dirty="0" smtClean="0"/>
+              <a:t>a streaming application </a:t>
+            </a:r>
+            <a:r>
+              <a:rPr lang="en-US" sz="1800" i="1" dirty="0" smtClean="0"/>
+              <a:t>(</a:t>
+            </a:r>
+            <a:r>
+              <a:rPr lang="en-US" sz="1800" i="1" dirty="0"/>
+              <a:t>point in stream, state)</a:t>
+            </a:r>
+            <a:endParaRPr lang="en-US" sz="2000" dirty="0"/>
+          </a:p>
+          <a:p>
+            <a:pPr marL="342900" marR="0" lvl="0" indent="-342900" algn="l" rtl="0">
+              <a:lnSpc>
+                <a:spcPct val="90000"/>
+              </a:lnSpc>
+              <a:spcBef>
+                <a:spcPts val="0"/>
+              </a:spcBef>
+              <a:spcAft>
+                <a:spcPts val="0"/>
+              </a:spcAft>
+              <a:buClr>
+                <a:srgbClr val="34AD91"/>
+              </a:buClr>
+              <a:buSzPct val="99107"/>
+              <a:buFont typeface="Noto Sans Symbols"/>
+              <a:buChar char="▪"/>
+            </a:pPr>
+            <a:endParaRPr lang="en-US" sz="2000" b="0" i="0" u="none" strike="noStrike" cap="none" dirty="0" smtClean="0">
+              <a:solidFill>
+                <a:schemeClr val="dk1"/>
+              </a:solidFill>
+              <a:sym typeface="Calibri"/>
+            </a:endParaRPr>
+          </a:p>
+          <a:p>
             <a:pPr marL="342900" marR="0" lvl="0" indent="-342900" algn="l" rtl="0">
               <a:lnSpc>
                 <a:spcPct val="90000"/>
@@ -25916,17 +26283,38 @@
               <a:buChar char="▪"/>
             </a:pPr>
             <a:r>
-              <a:rPr lang="en" sz="2775" b="0" i="0" u="none" strike="noStrike" cap="none" dirty="0">
-                <a:solidFill>
-                  <a:schemeClr val="dk1"/>
-                </a:solidFill>
-                <a:latin typeface="Calibri"/>
-                <a:ea typeface="Calibri"/>
-                <a:cs typeface="Calibri"/>
+              <a:rPr lang="en" sz="2000" b="0" i="0" u="none" strike="noStrike" cap="none" dirty="0" smtClean="0">
+                <a:solidFill>
+                  <a:schemeClr val="dk1"/>
+                </a:solidFill>
                 <a:sym typeface="Calibri"/>
               </a:rPr>
-              <a:t>Savepoints are user-triggered, retained checkpoints.</a:t>
+              <a:t>Savepoints </a:t>
             </a:r>
+            <a:r>
+              <a:rPr lang="en" sz="2000" b="0" i="0" u="none" strike="noStrike" cap="none" dirty="0">
+                <a:solidFill>
+                  <a:schemeClr val="dk1"/>
+                </a:solidFill>
+                <a:sym typeface="Calibri"/>
+              </a:rPr>
+              <a:t>are user-triggered, retained </a:t>
+            </a:r>
+            <a:r>
+              <a:rPr lang="en" sz="2000" b="0" i="0" u="none" strike="noStrike" cap="none" dirty="0" smtClean="0">
+                <a:solidFill>
+                  <a:schemeClr val="dk1"/>
+                </a:solidFill>
+                <a:sym typeface="Calibri"/>
+              </a:rPr>
+              <a:t>checkpoints</a:t>
+            </a:r>
+            <a:endParaRPr lang="en" sz="2000" b="0" i="0" u="none" strike="noStrike" cap="none" dirty="0">
+              <a:solidFill>
+                <a:schemeClr val="dk1"/>
+              </a:solidFill>
+              <a:sym typeface="Calibri"/>
+            </a:endParaRPr>
           </a:p>
           <a:p>
             <a:pPr marL="742950" marR="0" lvl="1" indent="-285750" algn="l" rtl="0">
@@ -25946,13 +26334,10 @@
               <a:buFont typeface="Arial"/>
               <a:buNone/>
             </a:pPr>
-            <a:endParaRPr sz="2405" b="0" i="0" u="none" strike="noStrike" cap="none" dirty="0">
+            <a:endParaRPr sz="2000" b="0" i="0" u="none" strike="noStrike" cap="none" dirty="0">
               <a:solidFill>
                 <a:schemeClr val="dk1"/>
               </a:solidFill>
-              <a:latin typeface="Calibri"/>
-              <a:ea typeface="Calibri"/>
-              <a:cs typeface="Calibri"/>
               <a:sym typeface="Calibri"/>
             </a:endParaRPr>
           </a:p>
@@ -25975,17 +26360,29 @@
               <a:buChar char="▪"/>
             </a:pPr>
             <a:r>
-              <a:rPr lang="en" sz="2775" b="0" i="0" u="none" strike="noStrike" cap="none" dirty="0">
-                <a:solidFill>
-                  <a:schemeClr val="dk1"/>
-                </a:solidFill>
-                <a:latin typeface="Calibri"/>
-                <a:ea typeface="Calibri"/>
-                <a:cs typeface="Calibri"/>
+              <a:rPr lang="en" sz="2000" b="0" i="0" u="none" strike="noStrike" cap="none" dirty="0">
+                <a:solidFill>
+                  <a:schemeClr val="dk1"/>
+                </a:solidFill>
                 <a:sym typeface="Calibri"/>
               </a:rPr>
-              <a:t>A program can be started from a savepoint.</a:t>
+              <a:t>A program can be started from a </a:t>
             </a:r>
+            <a:r>
+              <a:rPr lang="en" sz="2000" b="0" i="0" u="none" strike="noStrike" cap="none" dirty="0" smtClean="0">
+                <a:solidFill>
+                  <a:schemeClr val="dk1"/>
+                </a:solidFill>
+                <a:sym typeface="Calibri"/>
+              </a:rPr>
+              <a:t>savepoint</a:t>
+            </a:r>
+            <a:endParaRPr lang="en" sz="2000" b="0" i="0" u="none" strike="noStrike" cap="none" dirty="0">
+              <a:solidFill>
+                <a:schemeClr val="dk1"/>
+              </a:solidFill>
+              <a:sym typeface="Calibri"/>
+            </a:endParaRPr>
           </a:p>
           <a:p>
             <a:pPr marL="742950" marR="0" lvl="1" indent="-285750" algn="l" rtl="0">
@@ -26006,13 +26403,10 @@
               <a:buChar char="•"/>
             </a:pPr>
             <a:r>
-              <a:rPr lang="en" sz="2405" b="0" i="0" u="none" strike="noStrike" cap="none" dirty="0">
-                <a:solidFill>
-                  <a:schemeClr val="dk1"/>
-                </a:solidFill>
-                <a:latin typeface="Calibri"/>
-                <a:ea typeface="Calibri"/>
-                <a:cs typeface="Calibri"/>
+              <a:rPr lang="en" sz="2000" b="0" i="0" u="none" strike="noStrike" cap="none" dirty="0">
+                <a:solidFill>
+                  <a:schemeClr val="dk1"/>
+                </a:solidFill>
                 <a:sym typeface="Calibri"/>
               </a:rPr>
               <a:t>Initializes the operator state</a:t>
@@ -26036,13 +26430,10 @@
               <a:buFont typeface="Arial"/>
               <a:buNone/>
             </a:pPr>
-            <a:endParaRPr sz="2405" b="0" i="0" u="none" strike="noStrike" cap="none" dirty="0">
+            <a:endParaRPr sz="2000" b="0" i="0" u="none" strike="noStrike" cap="none" dirty="0">
               <a:solidFill>
                 <a:schemeClr val="dk1"/>
               </a:solidFill>
-              <a:latin typeface="Calibri"/>
-              <a:ea typeface="Calibri"/>
-              <a:cs typeface="Calibri"/>
               <a:sym typeface="Calibri"/>
             </a:endParaRPr>
           </a:p>
@@ -26065,13 +26456,10 @@
               <a:buChar char="▪"/>
             </a:pPr>
             <a:r>
-              <a:rPr lang="en" sz="2775" b="0" i="0" u="none" strike="noStrike" cap="none" dirty="0">
-                <a:solidFill>
-                  <a:schemeClr val="dk1"/>
-                </a:solidFill>
-                <a:latin typeface="Calibri"/>
-                <a:ea typeface="Calibri"/>
-                <a:cs typeface="Calibri"/>
+              <a:rPr lang="en" sz="2000" b="0" i="0" u="none" strike="noStrike" cap="none" dirty="0">
+                <a:solidFill>
+                  <a:schemeClr val="dk1"/>
+                </a:solidFill>
                 <a:sym typeface="Calibri"/>
               </a:rPr>
               <a:t>Savepoints are useful for</a:t>
@@ -26096,13 +26484,10 @@
               <a:buChar char="•"/>
             </a:pPr>
             <a:r>
-              <a:rPr lang="en" sz="2405" b="0" i="0" u="none" strike="noStrike" cap="none" dirty="0">
-                <a:solidFill>
-                  <a:schemeClr val="dk1"/>
-                </a:solidFill>
-                <a:latin typeface="Calibri"/>
-                <a:ea typeface="Calibri"/>
-                <a:cs typeface="Calibri"/>
+              <a:rPr lang="en" sz="2000" b="0" i="0" u="none" strike="noStrike" cap="none" dirty="0">
+                <a:solidFill>
+                  <a:schemeClr val="dk1"/>
+                </a:solidFill>
                 <a:sym typeface="Calibri"/>
               </a:rPr>
               <a:t>Application updates</a:t>
@@ -26127,13 +26512,10 @@
               <a:buChar char="•"/>
             </a:pPr>
             <a:r>
-              <a:rPr lang="en" sz="2405" b="0" i="0" u="none" strike="noStrike" cap="none" dirty="0">
-                <a:solidFill>
-                  <a:schemeClr val="dk1"/>
-                </a:solidFill>
-                <a:latin typeface="Calibri"/>
-                <a:ea typeface="Calibri"/>
-                <a:cs typeface="Calibri"/>
+              <a:rPr lang="en" sz="2000" b="0" i="0" u="none" strike="noStrike" cap="none" dirty="0">
+                <a:solidFill>
+                  <a:schemeClr val="dk1"/>
+                </a:solidFill>
                 <a:sym typeface="Calibri"/>
               </a:rPr>
               <a:t>Updating a Flink version</a:t>
@@ -26158,13 +26540,10 @@
               <a:buChar char="•"/>
             </a:pPr>
             <a:r>
-              <a:rPr lang="en" sz="2405" b="0" i="0" u="none" strike="noStrike" cap="none" dirty="0">
-                <a:solidFill>
-                  <a:schemeClr val="dk1"/>
-                </a:solidFill>
-                <a:latin typeface="Calibri"/>
-                <a:ea typeface="Calibri"/>
-                <a:cs typeface="Calibri"/>
+              <a:rPr lang="en" sz="2000" b="0" i="0" u="none" strike="noStrike" cap="none" dirty="0">
+                <a:solidFill>
+                  <a:schemeClr val="dk1"/>
+                </a:solidFill>
                 <a:sym typeface="Calibri"/>
               </a:rPr>
               <a:t>Maintenance &amp; migration</a:t>
@@ -26189,13 +26568,10 @@
               <a:buChar char="•"/>
             </a:pPr>
             <a:r>
-              <a:rPr lang="en" sz="2405" b="0" i="0" u="none" strike="noStrike" cap="none" dirty="0">
-                <a:solidFill>
-                  <a:schemeClr val="dk1"/>
-                </a:solidFill>
-                <a:latin typeface="Calibri"/>
-                <a:ea typeface="Calibri"/>
-                <a:cs typeface="Calibri"/>
+              <a:rPr lang="en" sz="2000" b="0" i="0" u="none" strike="noStrike" cap="none" dirty="0">
+                <a:solidFill>
+                  <a:schemeClr val="dk1"/>
+                </a:solidFill>
                 <a:sym typeface="Calibri"/>
               </a:rPr>
               <a:t>A/B testing</a:t>
@@ -26220,24 +26596,18 @@
               <a:buChar char="•"/>
             </a:pPr>
             <a:r>
-              <a:rPr lang="en" sz="2405" b="0" i="0" u="none" strike="noStrike" cap="none" dirty="0" smtClean="0">
-                <a:solidFill>
-                  <a:schemeClr val="dk1"/>
-                </a:solidFill>
-                <a:latin typeface="Calibri"/>
-                <a:ea typeface="Calibri"/>
-                <a:cs typeface="Calibri"/>
+              <a:rPr lang="en" sz="2000" b="0" i="0" u="none" strike="noStrike" cap="none" dirty="0" smtClean="0">
+                <a:solidFill>
+                  <a:schemeClr val="dk1"/>
+                </a:solidFill>
                 <a:sym typeface="Calibri"/>
               </a:rPr>
               <a:t>Rescaling</a:t>
             </a:r>
-            <a:endParaRPr lang="en" sz="2405" b="0" i="0" u="none" strike="noStrike" cap="none" dirty="0">
+            <a:endParaRPr lang="en" sz="2000" b="0" i="0" u="none" strike="noStrike" cap="none" dirty="0">
               <a:solidFill>
                 <a:schemeClr val="dk1"/>
               </a:solidFill>
-              <a:latin typeface="Calibri"/>
-              <a:ea typeface="Calibri"/>
-              <a:cs typeface="Calibri"/>
               <a:sym typeface="Calibri"/>
             </a:endParaRPr>
           </a:p>
@@ -26259,13 +26629,10 @@
               <a:buFont typeface="Arial"/>
               <a:buNone/>
             </a:pPr>
-            <a:endParaRPr sz="2405" b="0" i="0" u="none" strike="noStrike" cap="none" dirty="0">
+            <a:endParaRPr sz="2000" b="0" i="0" u="none" strike="noStrike" cap="none" dirty="0">
               <a:solidFill>
                 <a:schemeClr val="dk1"/>
               </a:solidFill>
-              <a:latin typeface="Calibri"/>
-              <a:ea typeface="Calibri"/>
-              <a:cs typeface="Calibri"/>
               <a:sym typeface="Calibri"/>
             </a:endParaRPr>
           </a:p>
@@ -26284,13 +26651,10 @@
               <a:buFont typeface="Arial"/>
               <a:buNone/>
             </a:pPr>
-            <a:endParaRPr sz="2405" b="0" i="0" u="none" strike="noStrike" cap="none" dirty="0">
+            <a:endParaRPr sz="2000" b="0" i="0" u="none" strike="noStrike" cap="none" dirty="0">
               <a:solidFill>
                 <a:schemeClr val="dk1"/>
               </a:solidFill>
-              <a:latin typeface="Calibri"/>
-              <a:ea typeface="Calibri"/>
-              <a:cs typeface="Calibri"/>
               <a:sym typeface="Calibri"/>
             </a:endParaRPr>
           </a:p>
@@ -26304,7 +26668,7 @@
 </p:sld>
 </file>
 
-<file path=ppt/slides/slide25.xml><?xml version="1.0" encoding="utf-8"?>
+<file path=ppt/slides/slide27.xml><?xml version="1.0" encoding="utf-8"?>
 <p:sld xmlns:a="http://schemas.openxmlformats.org/drawingml/2006/main" xmlns:r="http://schemas.openxmlformats.org/officeDocument/2006/relationships" xmlns:p="http://schemas.openxmlformats.org/presentationml/2006/main">
   <p:cSld>
     <p:spTree>
@@ -26717,7 +27081,7 @@
                 <a:cs typeface="Calibri"/>
                 <a:sym typeface="Calibri"/>
               </a:rPr>
-              <a:t>25</a:t>
+              <a:t>27</a:t>
             </a:fld>
             <a:endParaRPr lang="en" sz="1200">
               <a:solidFill>
@@ -28203,7 +28567,13 @@
         <p:nvGraphicFramePr>
           <p:cNvPr id="170" name="Shape 170"/>
           <p:cNvGraphicFramePr/>
-          <p:nvPr/>
+          <p:nvPr>
+            <p:extLst>
+              <p:ext uri="{D42A27DB-BD31-4B8C-83A1-F6EECF244321}">
+                <p14:modId xmlns:p14="http://schemas.microsoft.com/office/powerpoint/2010/main" val="1426649945"/>
+              </p:ext>
+            </p:extLst>
+          </p:nvPr>
         </p:nvGraphicFramePr>
         <p:xfrm>
           <a:off x="457200" y="1474787"/>
@@ -28217,8 +28587,8 @@
                 <a:tableStyleId>{607D908A-F18A-49CE-9149-614915D3E0F6}</a:tableStyleId>
               </a:tblPr>
               <a:tblGrid>
-                <a:gridCol w="3781250"/>
-                <a:gridCol w="4442600"/>
+                <a:gridCol w="3454975"/>
+                <a:gridCol w="4768875"/>
               </a:tblGrid>
               <a:tr h="370850">
                 <a:tc>
@@ -28338,9 +28708,22 @@
                         <a:buNone/>
                       </a:pPr>
                       <a:r>
-                        <a:rPr lang="en" sz="1800"/>
-                        <a:t>Exactly once (for idempotent updates)</a:t>
+                        <a:rPr lang="en" sz="1800" dirty="0"/>
+                        <a:t>Exactly once </a:t>
                       </a:r>
+                      <a:r>
+                        <a:rPr lang="en" sz="1800" dirty="0" smtClean="0"/>
+                        <a:t>for </a:t>
+                      </a:r>
+                      <a:r>
+                        <a:rPr lang="en" sz="1800" dirty="0"/>
+                        <a:t>idempotent </a:t>
+                      </a:r>
+                      <a:r>
+                        <a:rPr lang="en" sz="1800" dirty="0" smtClean="0"/>
+                        <a:t>updates</a:t>
+                      </a:r>
+                      <a:endParaRPr lang="en" sz="1800" dirty="0"/>
                     </a:p>
                   </a:txBody>
                   <a:tcPr marL="91450" marR="91450" marT="45725" marB="45725"/>
@@ -28352,57 +28735,25 @@
                     <a:bodyPr/>
                     <a:lstStyle/>
                     <a:p>
-                      <a:pPr marL="0" marR="0" lvl="0" indent="0" algn="l" rtl="0">
+                      <a:pPr marL="0" marR="0" lvl="0" indent="0" algn="l" defTabSz="914400" rtl="0" eaLnBrk="1" fontAlgn="auto" latinLnBrk="0" hangingPunct="1">
+                        <a:lnSpc>
+                          <a:spcPct val="100000"/>
+                        </a:lnSpc>
                         <a:spcBef>
                           <a:spcPts val="0"/>
                         </a:spcBef>
+                        <a:spcAft>
+                          <a:spcPts val="0"/>
+                        </a:spcAft>
+                        <a:buClrTx/>
                         <a:buSzPct val="25000"/>
+                        <a:buFontTx/>
                         <a:buNone/>
+                        <a:tabLst/>
+                        <a:defRPr/>
                       </a:pPr>
                       <a:r>
-                        <a:rPr lang="en" sz="1800"/>
-                        <a:t>Kafka</a:t>
-                      </a:r>
-                    </a:p>
-                  </a:txBody>
-                  <a:tcPr marL="91450" marR="91450" marT="45725" marB="45725"/>
-                </a:tc>
-                <a:tc>
-                  <a:txBody>
-                    <a:bodyPr/>
-                    <a:lstStyle/>
-                    <a:p>
-                      <a:pPr marL="0" marR="0" lvl="0" indent="0" algn="l" rtl="0">
-                        <a:spcBef>
-                          <a:spcPts val="0"/>
-                        </a:spcBef>
-                        <a:buSzPct val="25000"/>
-                        <a:buNone/>
-                      </a:pPr>
-                      <a:r>
-                        <a:rPr lang="en" sz="1800"/>
-                        <a:t>At least once</a:t>
-                      </a:r>
-                    </a:p>
-                  </a:txBody>
-                  <a:tcPr marL="91450" marR="91450" marT="45725" marB="45725"/>
-                </a:tc>
-              </a:tr>
-              <a:tr h="370850">
-                <a:tc>
-                  <a:txBody>
-                    <a:bodyPr/>
-                    <a:lstStyle/>
-                    <a:p>
-                      <a:pPr marL="0" marR="0" lvl="0" indent="0" algn="l" rtl="0">
-                        <a:spcBef>
-                          <a:spcPts val="0"/>
-                        </a:spcBef>
-                        <a:buSzPct val="25000"/>
-                        <a:buNone/>
-                      </a:pPr>
-                      <a:r>
-                        <a:rPr lang="en" sz="1800"/>
+                        <a:rPr lang="en" sz="1800" dirty="0" smtClean="0"/>
                         <a:t>Elasticsearch</a:t>
                       </a:r>
                     </a:p>
@@ -28422,7 +28773,74 @@
                         <a:buNone/>
                       </a:pPr>
                       <a:r>
-                        <a:rPr lang="en" sz="1800"/>
+                        <a:rPr lang="en-US" sz="1800" dirty="0" smtClean="0"/>
+                        <a:t>Exactly once for idempotent</a:t>
+                      </a:r>
+                      <a:r>
+                        <a:rPr lang="en-US" sz="1800" baseline="0" dirty="0" smtClean="0"/>
+                        <a:t> indexing</a:t>
+                      </a:r>
+                      <a:endParaRPr lang="en" sz="1800" dirty="0"/>
+                    </a:p>
+                  </a:txBody>
+                  <a:tcPr marL="91450" marR="91450" marT="45725" marB="45725"/>
+                </a:tc>
+              </a:tr>
+              <a:tr h="370850">
+                <a:tc>
+                  <a:txBody>
+                    <a:bodyPr/>
+                    <a:lstStyle/>
+                    <a:p>
+                      <a:pPr marL="0" marR="0" lvl="0" indent="0" algn="l" defTabSz="914400" rtl="0" eaLnBrk="1" fontAlgn="auto" latinLnBrk="0" hangingPunct="1">
+                        <a:lnSpc>
+                          <a:spcPct val="100000"/>
+                        </a:lnSpc>
+                        <a:spcBef>
+                          <a:spcPts val="0"/>
+                        </a:spcBef>
+                        <a:spcAft>
+                          <a:spcPts val="0"/>
+                        </a:spcAft>
+                        <a:buClrTx/>
+                        <a:buSzPct val="25000"/>
+                        <a:buFontTx/>
+                        <a:buNone/>
+                        <a:tabLst/>
+                        <a:defRPr/>
+                      </a:pPr>
+                      <a:r>
+                        <a:rPr lang="en" sz="1800" dirty="0" smtClean="0"/>
+                        <a:t>Kafka</a:t>
+                      </a:r>
+                    </a:p>
+                  </a:txBody>
+                  <a:tcPr marL="91450" marR="91450" marT="45725" marB="45725"/>
+                </a:tc>
+                <a:tc>
+                  <a:txBody>
+                    <a:bodyPr/>
+                    <a:lstStyle/>
+                    <a:p>
+                      <a:pPr marL="0" marR="0" lvl="0" indent="0" algn="l" defTabSz="914400" rtl="0" eaLnBrk="1" fontAlgn="auto" latinLnBrk="0" hangingPunct="1">
+                        <a:lnSpc>
+                          <a:spcPct val="100000"/>
+                        </a:lnSpc>
+                        <a:spcBef>
+                          <a:spcPts val="0"/>
+                        </a:spcBef>
+                        <a:spcAft>
+                          <a:spcPts val="0"/>
+                        </a:spcAft>
+                        <a:buClrTx/>
+                        <a:buSzPct val="25000"/>
+                        <a:buFontTx/>
+                        <a:buNone/>
+                        <a:tabLst/>
+                        <a:defRPr/>
+                      </a:pPr>
+                      <a:r>
+                        <a:rPr lang="en" sz="1800" dirty="0" smtClean="0"/>
                         <a:t>At least once</a:t>
                       </a:r>
                     </a:p>
@@ -28632,7 +29050,7 @@
                         <a:buNone/>
                       </a:pPr>
                       <a:r>
-                        <a:rPr lang="en" sz="1800"/>
+                        <a:rPr lang="en" sz="1800" dirty="0"/>
                         <a:t>At least once</a:t>
                       </a:r>
                     </a:p>

</xml_diff>